<commit_message>
Año 2015 - Ajuste a la Presentaciones
</commit_message>
<xml_diff>
--- a/Presentaciones/00. Presentacion - Introduccion a la Plataforma .NET.pptx
+++ b/Presentaciones/00. Presentacion - Introduccion a la Plataforma .NET.pptx
@@ -7,6 +7,9 @@
   <p:notesMasterIdLst>
     <p:notesMasterId r:id="rId29"/>
   </p:notesMasterIdLst>
+  <p:handoutMasterIdLst>
+    <p:handoutMasterId r:id="rId30"/>
+  </p:handoutMasterIdLst>
   <p:sldIdLst>
     <p:sldId id="256" r:id="rId2"/>
     <p:sldId id="257" r:id="rId3"/>
@@ -170,7 +173,7 @@
       </p14:sectionLst>
     </p:ext>
     <p:ext uri="{EFAFB233-063F-42B5-8137-9DF3F51BA10A}">
-      <p15:sldGuideLst xmlns:p15="http://schemas.microsoft.com/office/powerpoint/2012/main" xmlns="">
+      <p15:sldGuideLst xmlns:p15="http://schemas.microsoft.com/office/powerpoint/2012/main">
         <p15:guide id="1" orient="horz" pos="2160">
           <p15:clr>
             <a:srgbClr val="A4A3A4"/>
@@ -185,6 +188,171 @@
     </p:ext>
   </p:extLst>
 </p:presentation>
+</file>
+
+<file path=ppt/handoutMasters/handoutMaster1.xml><?xml version="1.0" encoding="utf-8"?>
+<p:handoutMaster xmlns:a="http://schemas.openxmlformats.org/drawingml/2006/main" xmlns:r="http://schemas.openxmlformats.org/officeDocument/2006/relationships" xmlns:p="http://schemas.openxmlformats.org/presentationml/2006/main">
+  <p:cSld>
+    <p:bg>
+      <p:bgRef idx="1001">
+        <a:schemeClr val="bg1"/>
+      </p:bgRef>
+    </p:bg>
+    <p:spTree>
+      <p:nvGrpSpPr>
+        <p:cNvPr id="1" name=""/>
+        <p:cNvGrpSpPr/>
+        <p:nvPr/>
+      </p:nvGrpSpPr>
+      <p:grpSpPr>
+        <a:xfrm>
+          <a:off x="0" y="0"/>
+          <a:ext cx="0" cy="0"/>
+          <a:chOff x="0" y="0"/>
+          <a:chExt cx="0" cy="0"/>
+        </a:xfrm>
+      </p:grpSpPr>
+      <p:sp>
+        <p:nvSpPr>
+          <p:cNvPr id="2" name="Marcador de encabezado 1"/>
+          <p:cNvSpPr>
+            <a:spLocks noGrp="1"/>
+          </p:cNvSpPr>
+          <p:nvPr>
+            <p:ph type="hdr" sz="quarter"/>
+          </p:nvPr>
+        </p:nvSpPr>
+        <p:spPr>
+          <a:xfrm>
+            <a:off x="0" y="0"/>
+            <a:ext cx="2971800" cy="458788"/>
+          </a:xfrm>
+          <a:prstGeom prst="rect">
+            <a:avLst/>
+          </a:prstGeom>
+        </p:spPr>
+        <p:txBody>
+          <a:bodyPr vert="horz" lIns="91440" tIns="45720" rIns="91440" bIns="45720" rtlCol="0"/>
+          <a:lstStyle>
+            <a:lvl1pPr algn="l">
+              <a:defRPr sz="1200"/>
+            </a:lvl1pPr>
+          </a:lstStyle>
+          <a:p>
+            <a:endParaRPr lang="es-AR"/>
+          </a:p>
+        </p:txBody>
+      </p:sp>
+      <p:sp>
+        <p:nvSpPr>
+          <p:cNvPr id="3" name="Marcador de fecha 2"/>
+          <p:cNvSpPr>
+            <a:spLocks noGrp="1"/>
+          </p:cNvSpPr>
+          <p:nvPr>
+            <p:ph type="dt" sz="quarter" idx="1"/>
+          </p:nvPr>
+        </p:nvSpPr>
+        <p:spPr>
+          <a:xfrm>
+            <a:off x="3884613" y="0"/>
+            <a:ext cx="2971800" cy="458788"/>
+          </a:xfrm>
+          <a:prstGeom prst="rect">
+            <a:avLst/>
+          </a:prstGeom>
+        </p:spPr>
+        <p:txBody>
+          <a:bodyPr vert="horz" lIns="91440" tIns="45720" rIns="91440" bIns="45720" rtlCol="0"/>
+          <a:lstStyle>
+            <a:lvl1pPr algn="r">
+              <a:defRPr sz="1200"/>
+            </a:lvl1pPr>
+          </a:lstStyle>
+          <a:p>
+            <a:fld id="{1B113009-E86D-4EAD-B57C-C146F81250E7}" type="datetimeFigureOut">
+              <a:rPr lang="es-AR" smtClean="0"/>
+              <a:t>07/03/2015</a:t>
+            </a:fld>
+            <a:endParaRPr lang="es-AR"/>
+          </a:p>
+        </p:txBody>
+      </p:sp>
+      <p:sp>
+        <p:nvSpPr>
+          <p:cNvPr id="4" name="Marcador de pie de página 3"/>
+          <p:cNvSpPr>
+            <a:spLocks noGrp="1"/>
+          </p:cNvSpPr>
+          <p:nvPr>
+            <p:ph type="ftr" sz="quarter" idx="2"/>
+          </p:nvPr>
+        </p:nvSpPr>
+        <p:spPr>
+          <a:xfrm>
+            <a:off x="0" y="8685213"/>
+            <a:ext cx="2971800" cy="458787"/>
+          </a:xfrm>
+          <a:prstGeom prst="rect">
+            <a:avLst/>
+          </a:prstGeom>
+        </p:spPr>
+        <p:txBody>
+          <a:bodyPr vert="horz" lIns="91440" tIns="45720" rIns="91440" bIns="45720" rtlCol="0" anchor="b"/>
+          <a:lstStyle>
+            <a:lvl1pPr algn="l">
+              <a:defRPr sz="1200"/>
+            </a:lvl1pPr>
+          </a:lstStyle>
+          <a:p>
+            <a:endParaRPr lang="es-AR"/>
+          </a:p>
+        </p:txBody>
+      </p:sp>
+      <p:sp>
+        <p:nvSpPr>
+          <p:cNvPr id="5" name="Marcador de número de diapositiva 4"/>
+          <p:cNvSpPr>
+            <a:spLocks noGrp="1"/>
+          </p:cNvSpPr>
+          <p:nvPr>
+            <p:ph type="sldNum" sz="quarter" idx="3"/>
+          </p:nvPr>
+        </p:nvSpPr>
+        <p:spPr>
+          <a:xfrm>
+            <a:off x="3884613" y="8685213"/>
+            <a:ext cx="2971800" cy="458787"/>
+          </a:xfrm>
+          <a:prstGeom prst="rect">
+            <a:avLst/>
+          </a:prstGeom>
+        </p:spPr>
+        <p:txBody>
+          <a:bodyPr vert="horz" lIns="91440" tIns="45720" rIns="91440" bIns="45720" rtlCol="0" anchor="b"/>
+          <a:lstStyle>
+            <a:lvl1pPr algn="r">
+              <a:defRPr sz="1200"/>
+            </a:lvl1pPr>
+          </a:lstStyle>
+          <a:p>
+            <a:fld id="{577707A8-3569-4FE3-A959-BE846696C2B9}" type="slidenum">
+              <a:rPr lang="es-AR" smtClean="0"/>
+              <a:t>‹Nº›</a:t>
+            </a:fld>
+            <a:endParaRPr lang="es-AR"/>
+          </a:p>
+        </p:txBody>
+      </p:sp>
+    </p:spTree>
+    <p:extLst>
+      <p:ext uri="{BB962C8B-B14F-4D97-AF65-F5344CB8AC3E}">
+        <p14:creationId xmlns:p14="http://schemas.microsoft.com/office/powerpoint/2010/main" val="2598632030"/>
+      </p:ext>
+    </p:extLst>
+  </p:cSld>
+  <p:clrMap bg1="lt1" tx1="dk1" bg2="lt2" tx2="dk2" accent1="accent1" accent2="accent2" accent3="accent3" accent4="accent4" accent5="accent5" accent6="accent6" hlink="hlink" folHlink="folHlink"/>
+</p:handoutMaster>
 </file>
 
 <file path=ppt/notesMasters/notesMaster1.xml><?xml version="1.0" encoding="utf-8"?>
@@ -270,7 +438,7 @@
           <a:p>
             <a:fld id="{052CBB1C-CCF2-4176-B982-0B59C5DF6987}" type="datetimeFigureOut">
               <a:rPr lang="es-ES"/>
-              <a:t>13/03/2014</a:t>
+              <a:t>07/03/2015</a:t>
             </a:fld>
             <a:endParaRPr lang="es-ES"/>
           </a:p>
@@ -2433,7 +2601,7 @@
           <a:p>
             <a:fld id="{43AE47C2-7708-47DB-9FAA-6062AA30ADF6}" type="datetime1">
               <a:rPr lang="es-ES" smtClean="0"/>
-              <a:t>13/03/2014</a:t>
+              <a:t>07/03/2015</a:t>
             </a:fld>
             <a:endParaRPr lang="es-ES"/>
           </a:p>
@@ -2624,7 +2792,7 @@
           <a:p>
             <a:fld id="{59109FB8-2422-49CE-BDF3-E9E550D5764E}" type="datetime1">
               <a:rPr lang="es-ES" smtClean="0"/>
-              <a:t>13/03/2014</a:t>
+              <a:t>07/03/2015</a:t>
             </a:fld>
             <a:endParaRPr lang="es-ES"/>
           </a:p>
@@ -2785,7 +2953,7 @@
           <a:p>
             <a:fld id="{77926DA7-5D72-4F12-8F2A-F04CC776D223}" type="datetime1">
               <a:rPr lang="es-ES" smtClean="0"/>
-              <a:t>13/03/2014</a:t>
+              <a:t>07/03/2015</a:t>
             </a:fld>
             <a:endParaRPr lang="es-ES"/>
           </a:p>
@@ -4621,7 +4789,7 @@
           <a:p>
             <a:fld id="{9D01752F-5823-44DB-83D2-46A69D079012}" type="datetime1">
               <a:rPr lang="es-ES" smtClean="0"/>
-              <a:t>13/03/2014</a:t>
+              <a:t>07/03/2015</a:t>
             </a:fld>
             <a:endParaRPr lang="es-ES"/>
           </a:p>
@@ -6501,7 +6669,7 @@
           <a:p>
             <a:fld id="{416B7652-279E-4D52-8ABB-111C80D6FADB}" type="datetime1">
               <a:rPr lang="es-ES" smtClean="0"/>
-              <a:t>13/03/2014</a:t>
+              <a:t>07/03/2015</a:t>
             </a:fld>
             <a:endParaRPr lang="es-ES"/>
           </a:p>
@@ -6624,7 +6792,7 @@
           <a:p>
             <a:fld id="{610A859C-7503-4066-8AED-5A71E1FE2FC6}" type="datetime1">
               <a:rPr lang="es-ES" smtClean="0"/>
-              <a:t>13/03/2014</a:t>
+              <a:t>07/03/2015</a:t>
             </a:fld>
             <a:endParaRPr lang="es-ES"/>
           </a:p>
@@ -7175,7 +7343,7 @@
           <a:p>
             <a:fld id="{9986FBFC-3386-4C98-9EB6-3E2BEF02CE77}" type="datetime1">
               <a:rPr lang="es-ES" smtClean="0"/>
-              <a:t>13/03/2014</a:t>
+              <a:t>07/03/2015</a:t>
             </a:fld>
             <a:endParaRPr lang="es-ES"/>
           </a:p>
@@ -7298,7 +7466,7 @@
           <a:p>
             <a:fld id="{65081C53-4D52-4766-9BAC-BBFA0CE04C54}" type="datetime1">
               <a:rPr lang="es-ES" smtClean="0"/>
-              <a:t>13/03/2014</a:t>
+              <a:t>07/03/2015</a:t>
             </a:fld>
             <a:endParaRPr lang="es-ES"/>
           </a:p>
@@ -9019,7 +9187,7 @@
           <a:p>
             <a:fld id="{D077B5FD-3802-4770-830F-876E7DEFC165}" type="datetime1">
               <a:rPr lang="es-ES" smtClean="0"/>
-              <a:t>13/03/2014</a:t>
+              <a:t>07/03/2015</a:t>
             </a:fld>
             <a:endParaRPr lang="es-ES"/>
           </a:p>
@@ -9180,7 +9348,7 @@
           <a:p>
             <a:fld id="{A7766F81-6B91-4FAB-8892-9408234BB9AF}" type="datetime1">
               <a:rPr lang="es-ES" smtClean="0"/>
-              <a:t>13/03/2014</a:t>
+              <a:t>07/03/2015</a:t>
             </a:fld>
             <a:endParaRPr lang="es-ES"/>
           </a:p>
@@ -12805,7 +12973,7 @@
           <a:p>
             <a:fld id="{EF8A5693-A335-447D-AF6B-2D563CE76BE2}" type="datetime1">
               <a:rPr lang="es-ES" smtClean="0"/>
-              <a:t>13/03/2014</a:t>
+              <a:t>07/03/2015</a:t>
             </a:fld>
             <a:endParaRPr lang="es-ES"/>
           </a:p>
@@ -14674,7 +14842,7 @@
           <a:p>
             <a:fld id="{CFB9D650-81BE-4A06-B1AA-4676F84F2C7D}" type="datetime1">
               <a:rPr lang="es-ES" smtClean="0"/>
-              <a:t>13/03/2014</a:t>
+              <a:t>07/03/2015</a:t>
             </a:fld>
             <a:endParaRPr lang="es-ES"/>
           </a:p>
@@ -15256,7 +15424,7 @@
         <p:spPr>
           <a:xfrm>
             <a:off x="8147057" y="6192982"/>
-            <a:ext cx="622286" cy="369332"/>
+            <a:ext cx="612668" cy="369332"/>
           </a:xfrm>
           <a:prstGeom prst="rect">
             <a:avLst/>
@@ -15271,7 +15439,7 @@
           <a:p>
             <a:r>
               <a:rPr lang="es-MX" dirty="0" smtClean="0"/>
-              <a:t>2014</a:t>
+              <a:t>2015</a:t>
             </a:r>
             <a:endParaRPr lang="es-AR" dirty="0"/>
           </a:p>
@@ -15546,7 +15714,7 @@
           <a:p>
             <a:fld id="{9D01752F-5823-44DB-83D2-46A69D079012}" type="datetime1">
               <a:rPr lang="es-ES" smtClean="0"/>
-              <a:t>13/03/2014</a:t>
+              <a:t>07/03/2015</a:t>
             </a:fld>
             <a:endParaRPr lang="es-ES"/>
           </a:p>
@@ -15749,7 +15917,7 @@
           <a:p>
             <a:fld id="{9D01752F-5823-44DB-83D2-46A69D079012}" type="datetime1">
               <a:rPr lang="es-ES" smtClean="0"/>
-              <a:t>13/03/2014</a:t>
+              <a:t>07/03/2015</a:t>
             </a:fld>
             <a:endParaRPr lang="es-ES"/>
           </a:p>
@@ -16190,7 +16358,7 @@
           <a:p>
             <a:fld id="{9D01752F-5823-44DB-83D2-46A69D079012}" type="datetime1">
               <a:rPr lang="es-ES" smtClean="0"/>
-              <a:t>13/03/2014</a:t>
+              <a:t>07/03/2015</a:t>
             </a:fld>
             <a:endParaRPr lang="es-ES"/>
           </a:p>
@@ -16378,7 +16546,7 @@
           <a:p>
             <a:fld id="{9D01752F-5823-44DB-83D2-46A69D079012}" type="datetime1">
               <a:rPr lang="es-ES" smtClean="0"/>
-              <a:t>13/03/2014</a:t>
+              <a:t>07/03/2015</a:t>
             </a:fld>
             <a:endParaRPr lang="es-ES"/>
           </a:p>
@@ -16627,7 +16795,7 @@
           <a:p>
             <a:fld id="{9D01752F-5823-44DB-83D2-46A69D079012}" type="datetime1">
               <a:rPr lang="es-ES" smtClean="0"/>
-              <a:t>13/03/2014</a:t>
+              <a:t>07/03/2015</a:t>
             </a:fld>
             <a:endParaRPr lang="es-ES"/>
           </a:p>
@@ -16759,7 +16927,7 @@
         </p:spPr>
         <p:txBody>
           <a:bodyPr>
-            <a:normAutofit fontScale="92500" lnSpcReduction="20000"/>
+            <a:normAutofit fontScale="92500" lnSpcReduction="10000"/>
           </a:bodyPr>
           <a:lstStyle/>
           <a:p>
@@ -16785,34 +16953,44 @@
             </a:r>
             <a:r>
               <a:rPr lang="es-AR" dirty="0"/>
-              <a:t> (WPF), ASP.NET MVC (</a:t>
-            </a:r>
-            <a:r>
-              <a:rPr lang="es-AR" dirty="0" err="1"/>
+              <a:t> (WPF</a:t>
+            </a:r>
+            <a:r>
+              <a:rPr lang="es-AR" dirty="0" smtClean="0"/>
+              <a:t>) y  </a:t>
+            </a:r>
+            <a:r>
+              <a:rPr lang="es-AR" dirty="0"/>
+              <a:t>ASP.NET MVC (</a:t>
+            </a:r>
+            <a:r>
+              <a:rPr lang="es-AR" dirty="0" err="1" smtClean="0"/>
               <a:t>Model</a:t>
             </a:r>
             <a:r>
+              <a:rPr lang="es-AR" dirty="0" smtClean="0"/>
+              <a:t>-View-</a:t>
+            </a:r>
+            <a:r>
+              <a:rPr lang="es-AR" dirty="0" err="1" smtClean="0"/>
+              <a:t>Controller</a:t>
+            </a:r>
+            <a:r>
+              <a:rPr lang="es-AR" dirty="0" smtClean="0"/>
+              <a:t>).</a:t>
+            </a:r>
+          </a:p>
+          <a:p>
+            <a:endParaRPr lang="es-AR" dirty="0" smtClean="0"/>
+          </a:p>
+          <a:p>
+            <a:r>
+              <a:rPr lang="es-AR" dirty="0" smtClean="0"/>
+              <a:t>Construcción </a:t>
+            </a:r>
+            <a:r>
               <a:rPr lang="es-AR" dirty="0"/>
-              <a:t>-View-</a:t>
-            </a:r>
-            <a:r>
-              <a:rPr lang="es-AR" dirty="0" err="1"/>
-              <a:t>Controller</a:t>
-            </a:r>
-            <a:r>
-              <a:rPr lang="es-AR" dirty="0"/>
-              <a:t>) y </a:t>
-            </a:r>
-            <a:r>
-              <a:rPr lang="es-AR" dirty="0" smtClean="0"/>
-              <a:t>Silverlight</a:t>
-            </a:r>
-            <a:endParaRPr lang="es-AR" dirty="0"/>
-          </a:p>
-          <a:p>
-            <a:r>
-              <a:rPr lang="es-AR" dirty="0"/>
-              <a:t>Construcción de Aplicaciones Desktop con Windows </a:t>
+              <a:t>de Aplicaciones Desktop con Windows </a:t>
             </a:r>
             <a:r>
               <a:rPr lang="es-AR" dirty="0" err="1"/>
@@ -16836,19 +17014,8 @@
             </a:r>
             <a:r>
               <a:rPr lang="es-AR" dirty="0"/>
-              <a:t>, Usando controles WPF, trabajando con datos. Creando Aplicaciones ASP.NET MVC: Entendiendo MVC, Creando Modelos, Construyendo controladores, Mostrando Vistas. Diseñando Aplicaciones </a:t>
-            </a:r>
-            <a:r>
-              <a:rPr lang="es-AR" dirty="0" err="1"/>
-              <a:t>Silverligth</a:t>
-            </a:r>
-            <a:r>
-              <a:rPr lang="es-AR" dirty="0"/>
-              <a:t>: Navegado el diseñador, usando controles, Desplegando Aplicaciones.</a:t>
-            </a:r>
-          </a:p>
-          <a:p>
-            <a:endParaRPr lang="es-AR" dirty="0"/>
+              <a:t>, Usando controles WPF, trabajando con datos. Creando Aplicaciones ASP.NET MVC: Entendiendo MVC, Creando Modelos, Construyendo controladores, Mostrando Vistas. </a:t>
+            </a:r>
           </a:p>
         </p:txBody>
       </p:sp>
@@ -16869,7 +17036,7 @@
           <a:p>
             <a:fld id="{9D01752F-5823-44DB-83D2-46A69D079012}" type="datetime1">
               <a:rPr lang="es-ES" smtClean="0"/>
-              <a:t>13/03/2014</a:t>
+              <a:t>07/03/2015</a:t>
             </a:fld>
             <a:endParaRPr lang="es-ES"/>
           </a:p>
@@ -16993,30 +17160,6 @@
           <a:xfrm>
             <a:off x="6769733" y="3424822"/>
             <a:ext cx="1784435" cy="955947"/>
-          </a:xfrm>
-          <a:prstGeom prst="rect">
-            <a:avLst/>
-          </a:prstGeom>
-        </p:spPr>
-      </p:pic>
-      <p:pic>
-        <p:nvPicPr>
-          <p:cNvPr id="10" name="Imagen 9"/>
-          <p:cNvPicPr>
-            <a:picLocks noChangeAspect="1"/>
-          </p:cNvPicPr>
-          <p:nvPr/>
-        </p:nvPicPr>
-        <p:blipFill>
-          <a:blip r:embed="rId4"/>
-          <a:stretch>
-            <a:fillRect/>
-          </a:stretch>
-        </p:blipFill>
-        <p:spPr>
-          <a:xfrm>
-            <a:off x="6945328" y="4664314"/>
-            <a:ext cx="1433243" cy="1302305"/>
           </a:xfrm>
           <a:prstGeom prst="rect">
             <a:avLst/>
@@ -17359,7 +17502,7 @@
           <a:p>
             <a:fld id="{9D01752F-5823-44DB-83D2-46A69D079012}" type="datetime1">
               <a:rPr lang="es-ES" smtClean="0"/>
-              <a:t>13/03/2014</a:t>
+              <a:t>07/03/2015</a:t>
             </a:fld>
             <a:endParaRPr lang="es-ES"/>
           </a:p>
@@ -17552,7 +17695,7 @@
           <a:p>
             <a:fld id="{9D01752F-5823-44DB-83D2-46A69D079012}" type="datetime1">
               <a:rPr lang="es-ES" smtClean="0"/>
-              <a:t>13/03/2014</a:t>
+              <a:t>07/03/2015</a:t>
             </a:fld>
             <a:endParaRPr lang="es-ES"/>
           </a:p>
@@ -17865,7 +18008,7 @@
           <a:p>
             <a:fld id="{9D01752F-5823-44DB-83D2-46A69D079012}" type="datetime1">
               <a:rPr lang="es-ES" smtClean="0"/>
-              <a:t>13/03/2014</a:t>
+              <a:t>07/03/2015</a:t>
             </a:fld>
             <a:endParaRPr lang="es-ES"/>
           </a:p>
@@ -18077,7 +18220,7 @@
           <a:p>
             <a:fld id="{9D01752F-5823-44DB-83D2-46A69D079012}" type="datetime1">
               <a:rPr lang="es-ES" smtClean="0"/>
-              <a:t>13/03/2014</a:t>
+              <a:t>07/03/2015</a:t>
             </a:fld>
             <a:endParaRPr lang="es-ES"/>
           </a:p>
@@ -18355,7 +18498,7 @@
           <a:p>
             <a:fld id="{B5E824A0-33F3-477E-B03A-23AA2F6B69F3}" type="datetime1">
               <a:rPr lang="es-ES" smtClean="0"/>
-              <a:t>13/03/2014</a:t>
+              <a:t>07/03/2015</a:t>
             </a:fld>
             <a:endParaRPr lang="es-ES"/>
           </a:p>
@@ -18656,7 +18799,7 @@
           <a:p>
             <a:fld id="{9D01752F-5823-44DB-83D2-46A69D079012}" type="datetime1">
               <a:rPr lang="es-ES" smtClean="0"/>
-              <a:t>13/03/2014</a:t>
+              <a:t>07/03/2015</a:t>
             </a:fld>
             <a:endParaRPr lang="es-ES"/>
           </a:p>
@@ -18830,7 +18973,7 @@
           <a:p>
             <a:fld id="{9D01752F-5823-44DB-83D2-46A69D079012}" type="datetime1">
               <a:rPr lang="es-ES" smtClean="0"/>
-              <a:t>13/03/2014</a:t>
+              <a:t>07/03/2015</a:t>
             </a:fld>
             <a:endParaRPr lang="es-ES"/>
           </a:p>
@@ -19235,7 +19378,7 @@
           <a:p>
             <a:fld id="{9D01752F-5823-44DB-83D2-46A69D079012}" type="datetime1">
               <a:rPr lang="es-ES" smtClean="0"/>
-              <a:t>13/03/2014</a:t>
+              <a:t>07/03/2015</a:t>
             </a:fld>
             <a:endParaRPr lang="es-ES"/>
           </a:p>
@@ -19398,7 +19541,7 @@
           <a:p>
             <a:fld id="{9D01752F-5823-44DB-83D2-46A69D079012}" type="datetime1">
               <a:rPr lang="es-ES" smtClean="0"/>
-              <a:t>13/03/2014</a:t>
+              <a:t>07/03/2015</a:t>
             </a:fld>
             <a:endParaRPr lang="es-ES"/>
           </a:p>
@@ -19719,7 +19862,7 @@
           <a:p>
             <a:fld id="{9D01752F-5823-44DB-83D2-46A69D079012}" type="datetime1">
               <a:rPr lang="es-ES" smtClean="0"/>
-              <a:t>13/03/2014</a:t>
+              <a:t>07/03/2015</a:t>
             </a:fld>
             <a:endParaRPr lang="es-ES"/>
           </a:p>
@@ -19850,7 +19993,7 @@
           <a:p>
             <a:fld id="{9D01752F-5823-44DB-83D2-46A69D079012}" type="datetime1">
               <a:rPr lang="es-ES" smtClean="0"/>
-              <a:t>13/03/2014</a:t>
+              <a:t>07/03/2015</a:t>
             </a:fld>
             <a:endParaRPr lang="es-ES"/>
           </a:p>
@@ -19928,7 +20071,7 @@
       </p:sp>
       <p:pic>
         <p:nvPicPr>
-          <p:cNvPr id="9" name="Imagen 8"/>
+          <p:cNvPr id="2" name="Imagen 1"/>
           <p:cNvPicPr>
             <a:picLocks noChangeAspect="1"/>
           </p:cNvPicPr>
@@ -19942,8 +20085,8 @@
         </p:blipFill>
         <p:spPr>
           <a:xfrm>
-            <a:off x="1213874" y="2276872"/>
-            <a:ext cx="6716251" cy="2914800"/>
+            <a:off x="1115616" y="2276872"/>
+            <a:ext cx="7207848" cy="3305016"/>
           </a:xfrm>
           <a:prstGeom prst="rect">
             <a:avLst/>
@@ -20028,13 +20171,8 @@
           <a:p>
             <a:r>
               <a:rPr lang="es-ES_tradnl" dirty="0" smtClean="0"/>
-              <a:t>No presentar el hito, significa hito no evaluado, pero participa </a:t>
-            </a:r>
-            <a:r>
-              <a:rPr lang="es-ES_tradnl" smtClean="0"/>
-              <a:t>del cálculo.</a:t>
-            </a:r>
-            <a:endParaRPr lang="es-ES_tradnl" dirty="0" smtClean="0"/>
+              <a:t>No presentar el hito, significa hito no evaluado, pero participa del cálculo.</a:t>
+            </a:r>
           </a:p>
         </p:txBody>
       </p:sp>
@@ -20055,7 +20193,7 @@
           <a:p>
             <a:fld id="{9D01752F-5823-44DB-83D2-46A69D079012}" type="datetime1">
               <a:rPr lang="es-ES" smtClean="0"/>
-              <a:t>13/03/2014</a:t>
+              <a:t>07/03/2015</a:t>
             </a:fld>
             <a:endParaRPr lang="es-ES"/>
           </a:p>
@@ -20153,7 +20291,7 @@
           <a:graphicData uri="http://schemas.openxmlformats.org/presentationml/2006/ole">
             <mc:AlternateContent xmlns:mc="http://schemas.openxmlformats.org/markup-compatibility/2006">
               <mc:Choice xmlns:v="urn:schemas-microsoft-com:vml" Requires="v">
-                <p:oleObj spid="_x0000_s4101" name="Ecuación" r:id="rId3" imgW="3644640" imgH="431640" progId="Equation.3">
+                <p:oleObj spid="_x0000_s4103" name="Ecuación" r:id="rId3" imgW="3644640" imgH="431640" progId="Equation.3">
                   <p:embed/>
                 </p:oleObj>
               </mc:Choice>
@@ -20230,38 +20368,45 @@
         </p:nvSpPr>
         <p:spPr/>
         <p:txBody>
-          <a:bodyPr/>
+          <a:bodyPr>
+            <a:normAutofit fontScale="85000" lnSpcReduction="20000"/>
+          </a:bodyPr>
           <a:lstStyle/>
           <a:p>
             <a:r>
               <a:rPr lang="es-MX" dirty="0" smtClean="0"/>
-              <a:t>Visual Studio Express </a:t>
+              <a:t>Visual Studio </a:t>
+            </a:r>
+            <a:r>
+              <a:rPr lang="es-MX" dirty="0" smtClean="0"/>
+              <a:t>2013 </a:t>
             </a:r>
             <a:r>
               <a:rPr lang="es-MX" dirty="0" err="1" smtClean="0"/>
-              <a:t>For</a:t>
+              <a:t>Community</a:t>
             </a:r>
             <a:r>
               <a:rPr lang="es-MX" dirty="0" smtClean="0"/>
-              <a:t> Windows Desktop 2013</a:t>
-            </a:r>
-          </a:p>
-          <a:p>
-            <a:endParaRPr lang="es-MX" dirty="0"/>
-          </a:p>
-          <a:p>
-            <a:r>
-              <a:rPr lang="es-MX" dirty="0" smtClean="0"/>
-              <a:t>Visual Studio Express </a:t>
-            </a:r>
-            <a:r>
-              <a:rPr lang="es-MX" dirty="0" err="1" smtClean="0"/>
-              <a:t>For</a:t>
-            </a:r>
-            <a:r>
-              <a:rPr lang="es-MX" dirty="0" smtClean="0"/>
-              <a:t> Web 2013</a:t>
-            </a:r>
+              <a:t>:</a:t>
+            </a:r>
+          </a:p>
+          <a:p>
+            <a:r>
+              <a:rPr lang="es-MX" dirty="0">
+                <a:hlinkClick r:id="rId2"/>
+              </a:rPr>
+              <a:t>https://</a:t>
+            </a:r>
+            <a:r>
+              <a:rPr lang="es-MX" dirty="0" smtClean="0">
+                <a:hlinkClick r:id="rId2"/>
+              </a:rPr>
+              <a:t>www.visualstudio.com/en-us/products/visual-studio-community-vs.aspx</a:t>
+            </a:r>
+            <a:endParaRPr lang="es-MX" dirty="0" smtClean="0"/>
+          </a:p>
+          <a:p>
+            <a:endParaRPr lang="es-MX" dirty="0" smtClean="0"/>
           </a:p>
           <a:p>
             <a:endParaRPr lang="es-MX" dirty="0"/>
@@ -20275,18 +20420,6 @@
           <a:p>
             <a:pPr lvl="1"/>
             <a:r>
-              <a:rPr lang="es-MX" dirty="0" err="1" smtClean="0"/>
-              <a:t>Modelio</a:t>
-            </a:r>
-            <a:r>
-              <a:rPr lang="es-MX" dirty="0"/>
-              <a:t>.</a:t>
-            </a:r>
-            <a:endParaRPr lang="es-MX" dirty="0" smtClean="0"/>
-          </a:p>
-          <a:p>
-            <a:pPr lvl="1"/>
-            <a:r>
               <a:rPr lang="es-MX" dirty="0" smtClean="0"/>
               <a:t>Visual </a:t>
             </a:r>
@@ -20317,17 +20450,118 @@
           </a:p>
           <a:p>
             <a:pPr lvl="1"/>
+            <a:r>
+              <a:rPr lang="es-MX" dirty="0">
+                <a:hlinkClick r:id="rId3"/>
+              </a:rPr>
+              <a:t>http://</a:t>
+            </a:r>
+            <a:r>
+              <a:rPr lang="es-MX" dirty="0" smtClean="0">
+                <a:hlinkClick r:id="rId3"/>
+              </a:rPr>
+              <a:t>www.visual-paradigm.com/download/community.jsp</a:t>
+            </a:r>
+            <a:endParaRPr lang="es-MX" dirty="0" smtClean="0"/>
+          </a:p>
+          <a:p>
+            <a:pPr lvl="1"/>
+            <a:endParaRPr lang="es-MX" dirty="0" smtClean="0"/>
+          </a:p>
+          <a:p>
+            <a:pPr marL="301943" lvl="1" indent="0">
+              <a:buNone/>
+            </a:pPr>
+            <a:endParaRPr lang="es-MX" dirty="0" smtClean="0"/>
+          </a:p>
+          <a:p>
+            <a:pPr lvl="1"/>
             <a:endParaRPr lang="es-MX" dirty="0"/>
           </a:p>
           <a:p>
+            <a:r>
+              <a:rPr lang="es-MX" dirty="0" smtClean="0"/>
+              <a:t>Control de Versiones:</a:t>
+            </a:r>
+          </a:p>
+          <a:p>
+            <a:pPr lvl="1"/>
+            <a:r>
+              <a:rPr lang="es-MX" dirty="0" smtClean="0"/>
+              <a:t>Repositorio Central: </a:t>
+            </a:r>
             <a:r>
               <a:rPr lang="es-MX" dirty="0" err="1" smtClean="0"/>
               <a:t>Github</a:t>
             </a:r>
             <a:r>
-              <a:rPr lang="es-MX" dirty="0" smtClean="0"/>
-              <a:t>.</a:t>
-            </a:r>
+              <a:rPr lang="es-MX" dirty="0"/>
+              <a:t>: </a:t>
+            </a:r>
+            <a:r>
+              <a:rPr lang="es-MX" dirty="0">
+                <a:hlinkClick r:id="rId4"/>
+              </a:rPr>
+              <a:t>https://github.com</a:t>
+            </a:r>
+            <a:r>
+              <a:rPr lang="es-MX" dirty="0" smtClean="0">
+                <a:hlinkClick r:id="rId4"/>
+              </a:rPr>
+              <a:t>/</a:t>
+            </a:r>
+            <a:endParaRPr lang="es-MX" dirty="0" smtClean="0"/>
+          </a:p>
+          <a:p>
+            <a:pPr lvl="1"/>
+            <a:r>
+              <a:rPr lang="es-MX" dirty="0"/>
+              <a:t>Cliente: </a:t>
+            </a:r>
+            <a:r>
+              <a:rPr lang="es-MX" dirty="0">
+                <a:hlinkClick r:id="rId5"/>
+              </a:rPr>
+              <a:t>https://windows.github.com</a:t>
+            </a:r>
+            <a:r>
+              <a:rPr lang="es-MX" dirty="0" smtClean="0">
+                <a:hlinkClick r:id="rId5"/>
+              </a:rPr>
+              <a:t>/</a:t>
+            </a:r>
+            <a:endParaRPr lang="es-MX" dirty="0" smtClean="0"/>
+          </a:p>
+          <a:p>
+            <a:pPr lvl="1"/>
+            <a:r>
+              <a:rPr lang="es-MX" dirty="0" err="1" smtClean="0"/>
+              <a:t>SourceTree</a:t>
+            </a:r>
+            <a:r>
+              <a:rPr lang="es-MX" dirty="0"/>
+              <a:t>: </a:t>
+            </a:r>
+            <a:r>
+              <a:rPr lang="es-MX" dirty="0">
+                <a:hlinkClick r:id="rId6"/>
+              </a:rPr>
+              <a:t>http://www.sourcetreeapp.com</a:t>
+            </a:r>
+            <a:r>
+              <a:rPr lang="es-MX" dirty="0" smtClean="0">
+                <a:hlinkClick r:id="rId6"/>
+              </a:rPr>
+              <a:t>/</a:t>
+            </a:r>
+            <a:endParaRPr lang="es-MX" dirty="0" smtClean="0"/>
+          </a:p>
+          <a:p>
+            <a:pPr lvl="1"/>
+            <a:endParaRPr lang="es-MX" dirty="0" smtClean="0"/>
+          </a:p>
+          <a:p>
+            <a:endParaRPr lang="es-MX" dirty="0" smtClean="0"/>
           </a:p>
           <a:p>
             <a:endParaRPr lang="es-AR" dirty="0"/>
@@ -20351,7 +20585,7 @@
           <a:p>
             <a:fld id="{9D01752F-5823-44DB-83D2-46A69D079012}" type="datetime1">
               <a:rPr lang="es-ES" smtClean="0"/>
-              <a:t>13/03/2014</a:t>
+              <a:t>07/03/2015</a:t>
             </a:fld>
             <a:endParaRPr lang="es-ES"/>
           </a:p>
@@ -20587,7 +20821,7 @@
           <a:p>
             <a:fld id="{9D01752F-5823-44DB-83D2-46A69D079012}" type="datetime1">
               <a:rPr lang="es-ES" smtClean="0"/>
-              <a:t>13/03/2014</a:t>
+              <a:t>07/03/2015</a:t>
             </a:fld>
             <a:endParaRPr lang="es-ES"/>
           </a:p>
@@ -20786,7 +21020,7 @@
           <a:p>
             <a:fld id="{9D01752F-5823-44DB-83D2-46A69D079012}" type="datetime1">
               <a:rPr lang="es-ES" smtClean="0"/>
-              <a:t>13/03/2014</a:t>
+              <a:t>07/03/2015</a:t>
             </a:fld>
             <a:endParaRPr lang="es-ES"/>
           </a:p>
@@ -21069,7 +21303,7 @@
           <a:p>
             <a:fld id="{9D01752F-5823-44DB-83D2-46A69D079012}" type="datetime1">
               <a:rPr lang="es-ES" smtClean="0"/>
-              <a:t>13/03/2014</a:t>
+              <a:t>07/03/2015</a:t>
             </a:fld>
             <a:endParaRPr lang="es-ES"/>
           </a:p>
@@ -21480,7 +21714,7 @@
           <a:p>
             <a:fld id="{9D01752F-5823-44DB-83D2-46A69D079012}" type="datetime1">
               <a:rPr lang="es-ES" smtClean="0"/>
-              <a:t>13/03/2014</a:t>
+              <a:t>07/03/2015</a:t>
             </a:fld>
             <a:endParaRPr lang="es-ES"/>
           </a:p>
@@ -21679,7 +21913,7 @@
           <a:p>
             <a:fld id="{9D01752F-5823-44DB-83D2-46A69D079012}" type="datetime1">
               <a:rPr lang="es-ES" smtClean="0"/>
-              <a:t>13/03/2014</a:t>
+              <a:t>07/03/2015</a:t>
             </a:fld>
             <a:endParaRPr lang="es-ES"/>
           </a:p>
@@ -22069,7 +22303,7 @@
           <a:p>
             <a:fld id="{9D01752F-5823-44DB-83D2-46A69D079012}" type="datetime1">
               <a:rPr lang="es-ES" smtClean="0"/>
-              <a:t>13/03/2014</a:t>
+              <a:t>07/03/2015</a:t>
             </a:fld>
             <a:endParaRPr lang="es-ES"/>
           </a:p>
@@ -22290,7 +22524,7 @@
           <a:p>
             <a:fld id="{9D01752F-5823-44DB-83D2-46A69D079012}" type="datetime1">
               <a:rPr lang="es-ES" smtClean="0"/>
-              <a:t>13/03/2014</a:t>
+              <a:t>07/03/2015</a:t>
             </a:fld>
             <a:endParaRPr lang="es-ES"/>
           </a:p>
@@ -22990,4 +23224,265 @@
   <a:objectDefaults/>
   <a:extraClrSchemeLst/>
 </a:theme>
+</file>
+
+<file path=ppt/theme/theme3.xml><?xml version="1.0" encoding="utf-8"?>
+<a:theme xmlns:a="http://schemas.openxmlformats.org/drawingml/2006/main" name="Tema de Office">
+  <a:themeElements>
+    <a:clrScheme name="Office">
+      <a:dk1>
+        <a:sysClr val="windowText" lastClr="000000"/>
+      </a:dk1>
+      <a:lt1>
+        <a:sysClr val="window" lastClr="FFFFFF"/>
+      </a:lt1>
+      <a:dk2>
+        <a:srgbClr val="44546A"/>
+      </a:dk2>
+      <a:lt2>
+        <a:srgbClr val="E7E6E6"/>
+      </a:lt2>
+      <a:accent1>
+        <a:srgbClr val="5B9BD5"/>
+      </a:accent1>
+      <a:accent2>
+        <a:srgbClr val="ED7D31"/>
+      </a:accent2>
+      <a:accent3>
+        <a:srgbClr val="A5A5A5"/>
+      </a:accent3>
+      <a:accent4>
+        <a:srgbClr val="FFC000"/>
+      </a:accent4>
+      <a:accent5>
+        <a:srgbClr val="4472C4"/>
+      </a:accent5>
+      <a:accent6>
+        <a:srgbClr val="70AD47"/>
+      </a:accent6>
+      <a:hlink>
+        <a:srgbClr val="0563C1"/>
+      </a:hlink>
+      <a:folHlink>
+        <a:srgbClr val="954F72"/>
+      </a:folHlink>
+    </a:clrScheme>
+    <a:fontScheme name="Office">
+      <a:majorFont>
+        <a:latin typeface="Calibri Light" panose="020F0302020204030204"/>
+        <a:ea typeface=""/>
+        <a:cs typeface=""/>
+        <a:font script="Jpan" typeface="ＭＳ Ｐゴシック"/>
+        <a:font script="Hang" typeface="맑은 고딕"/>
+        <a:font script="Hans" typeface="宋体"/>
+        <a:font script="Hant" typeface="新細明體"/>
+        <a:font script="Arab" typeface="Times New Roman"/>
+        <a:font script="Hebr" typeface="Times New Roman"/>
+        <a:font script="Thai" typeface="Angsana New"/>
+        <a:font script="Ethi" typeface="Nyala"/>
+        <a:font script="Beng" typeface="Vrinda"/>
+        <a:font script="Gujr" typeface="Shruti"/>
+        <a:font script="Khmr" typeface="MoolBoran"/>
+        <a:font script="Knda" typeface="Tunga"/>
+        <a:font script="Guru" typeface="Raavi"/>
+        <a:font script="Cans" typeface="Euphemia"/>
+        <a:font script="Cher" typeface="Plantagenet Cherokee"/>
+        <a:font script="Yiii" typeface="Microsoft Yi Baiti"/>
+        <a:font script="Tibt" typeface="Microsoft Himalaya"/>
+        <a:font script="Thaa" typeface="MV Boli"/>
+        <a:font script="Deva" typeface="Mangal"/>
+        <a:font script="Telu" typeface="Gautami"/>
+        <a:font script="Taml" typeface="Latha"/>
+        <a:font script="Syrc" typeface="Estrangelo Edessa"/>
+        <a:font script="Orya" typeface="Kalinga"/>
+        <a:font script="Mlym" typeface="Kartika"/>
+        <a:font script="Laoo" typeface="DokChampa"/>
+        <a:font script="Sinh" typeface="Iskoola Pota"/>
+        <a:font script="Mong" typeface="Mongolian Baiti"/>
+        <a:font script="Viet" typeface="Times New Roman"/>
+        <a:font script="Uigh" typeface="Microsoft Uighur"/>
+        <a:font script="Geor" typeface="Sylfaen"/>
+      </a:majorFont>
+      <a:minorFont>
+        <a:latin typeface="Calibri" panose="020F0502020204030204"/>
+        <a:ea typeface=""/>
+        <a:cs typeface=""/>
+        <a:font script="Jpan" typeface="ＭＳ Ｐゴシック"/>
+        <a:font script="Hang" typeface="맑은 고딕"/>
+        <a:font script="Hans" typeface="宋体"/>
+        <a:font script="Hant" typeface="新細明體"/>
+        <a:font script="Arab" typeface="Arial"/>
+        <a:font script="Hebr" typeface="Arial"/>
+        <a:font script="Thai" typeface="Cordia New"/>
+        <a:font script="Ethi" typeface="Nyala"/>
+        <a:font script="Beng" typeface="Vrinda"/>
+        <a:font script="Gujr" typeface="Shruti"/>
+        <a:font script="Khmr" typeface="DaunPenh"/>
+        <a:font script="Knda" typeface="Tunga"/>
+        <a:font script="Guru" typeface="Raavi"/>
+        <a:font script="Cans" typeface="Euphemia"/>
+        <a:font script="Cher" typeface="Plantagenet Cherokee"/>
+        <a:font script="Yiii" typeface="Microsoft Yi Baiti"/>
+        <a:font script="Tibt" typeface="Microsoft Himalaya"/>
+        <a:font script="Thaa" typeface="MV Boli"/>
+        <a:font script="Deva" typeface="Mangal"/>
+        <a:font script="Telu" typeface="Gautami"/>
+        <a:font script="Taml" typeface="Latha"/>
+        <a:font script="Syrc" typeface="Estrangelo Edessa"/>
+        <a:font script="Orya" typeface="Kalinga"/>
+        <a:font script="Mlym" typeface="Kartika"/>
+        <a:font script="Laoo" typeface="DokChampa"/>
+        <a:font script="Sinh" typeface="Iskoola Pota"/>
+        <a:font script="Mong" typeface="Mongolian Baiti"/>
+        <a:font script="Viet" typeface="Arial"/>
+        <a:font script="Uigh" typeface="Microsoft Uighur"/>
+        <a:font script="Geor" typeface="Sylfaen"/>
+      </a:minorFont>
+    </a:fontScheme>
+    <a:fmtScheme name="Office">
+      <a:fillStyleLst>
+        <a:solidFill>
+          <a:schemeClr val="phClr"/>
+        </a:solidFill>
+        <a:gradFill rotWithShape="1">
+          <a:gsLst>
+            <a:gs pos="0">
+              <a:schemeClr val="phClr">
+                <a:lumMod val="110000"/>
+                <a:satMod val="105000"/>
+                <a:tint val="67000"/>
+              </a:schemeClr>
+            </a:gs>
+            <a:gs pos="50000">
+              <a:schemeClr val="phClr">
+                <a:lumMod val="105000"/>
+                <a:satMod val="103000"/>
+                <a:tint val="73000"/>
+              </a:schemeClr>
+            </a:gs>
+            <a:gs pos="100000">
+              <a:schemeClr val="phClr">
+                <a:lumMod val="105000"/>
+                <a:satMod val="109000"/>
+                <a:tint val="81000"/>
+              </a:schemeClr>
+            </a:gs>
+          </a:gsLst>
+          <a:lin ang="5400000" scaled="0"/>
+        </a:gradFill>
+        <a:gradFill rotWithShape="1">
+          <a:gsLst>
+            <a:gs pos="0">
+              <a:schemeClr val="phClr">
+                <a:satMod val="103000"/>
+                <a:lumMod val="102000"/>
+                <a:tint val="94000"/>
+              </a:schemeClr>
+            </a:gs>
+            <a:gs pos="50000">
+              <a:schemeClr val="phClr">
+                <a:satMod val="110000"/>
+                <a:lumMod val="100000"/>
+                <a:shade val="100000"/>
+              </a:schemeClr>
+            </a:gs>
+            <a:gs pos="100000">
+              <a:schemeClr val="phClr">
+                <a:lumMod val="99000"/>
+                <a:satMod val="120000"/>
+                <a:shade val="78000"/>
+              </a:schemeClr>
+            </a:gs>
+          </a:gsLst>
+          <a:lin ang="5400000" scaled="0"/>
+        </a:gradFill>
+      </a:fillStyleLst>
+      <a:lnStyleLst>
+        <a:ln w="6350" cap="flat" cmpd="sng" algn="ctr">
+          <a:solidFill>
+            <a:schemeClr val="phClr"/>
+          </a:solidFill>
+          <a:prstDash val="solid"/>
+          <a:miter lim="800000"/>
+        </a:ln>
+        <a:ln w="12700" cap="flat" cmpd="sng" algn="ctr">
+          <a:solidFill>
+            <a:schemeClr val="phClr"/>
+          </a:solidFill>
+          <a:prstDash val="solid"/>
+          <a:miter lim="800000"/>
+        </a:ln>
+        <a:ln w="19050" cap="flat" cmpd="sng" algn="ctr">
+          <a:solidFill>
+            <a:schemeClr val="phClr"/>
+          </a:solidFill>
+          <a:prstDash val="solid"/>
+          <a:miter lim="800000"/>
+        </a:ln>
+      </a:lnStyleLst>
+      <a:effectStyleLst>
+        <a:effectStyle>
+          <a:effectLst/>
+        </a:effectStyle>
+        <a:effectStyle>
+          <a:effectLst/>
+        </a:effectStyle>
+        <a:effectStyle>
+          <a:effectLst>
+            <a:outerShdw blurRad="57150" dist="19050" dir="5400000" algn="ctr" rotWithShape="0">
+              <a:srgbClr val="000000">
+                <a:alpha val="63000"/>
+              </a:srgbClr>
+            </a:outerShdw>
+          </a:effectLst>
+        </a:effectStyle>
+      </a:effectStyleLst>
+      <a:bgFillStyleLst>
+        <a:solidFill>
+          <a:schemeClr val="phClr"/>
+        </a:solidFill>
+        <a:solidFill>
+          <a:schemeClr val="phClr">
+            <a:tint val="95000"/>
+            <a:satMod val="170000"/>
+          </a:schemeClr>
+        </a:solidFill>
+        <a:gradFill rotWithShape="1">
+          <a:gsLst>
+            <a:gs pos="0">
+              <a:schemeClr val="phClr">
+                <a:tint val="93000"/>
+                <a:satMod val="150000"/>
+                <a:shade val="98000"/>
+                <a:lumMod val="102000"/>
+              </a:schemeClr>
+            </a:gs>
+            <a:gs pos="50000">
+              <a:schemeClr val="phClr">
+                <a:tint val="98000"/>
+                <a:satMod val="130000"/>
+                <a:shade val="90000"/>
+                <a:lumMod val="103000"/>
+              </a:schemeClr>
+            </a:gs>
+            <a:gs pos="100000">
+              <a:schemeClr val="phClr">
+                <a:shade val="63000"/>
+                <a:satMod val="120000"/>
+              </a:schemeClr>
+            </a:gs>
+          </a:gsLst>
+          <a:lin ang="5400000" scaled="0"/>
+        </a:gradFill>
+      </a:bgFillStyleLst>
+    </a:fmtScheme>
+  </a:themeElements>
+  <a:objectDefaults/>
+  <a:extraClrSchemeLst/>
+  <a:extLst>
+    <a:ext uri="{05A4C25C-085E-4340-85A3-A5531E510DB2}">
+      <thm15:themeFamily xmlns:thm15="http://schemas.microsoft.com/office/thememl/2012/main" name="Office Theme" id="{62F939B6-93AF-4DB8-9C6B-D6C7DFDC589F}" vid="{4A3C46E8-61CC-4603-A589-7422A47A8E4A}"/>
+    </a:ext>
+  </a:extLst>
+</a:theme>
 </file>
</xml_diff>

<commit_message>
Modificaciones nombre de archivos
</commit_message>
<xml_diff>
--- a/Presentaciones/00. Presentacion - Introduccion a la Plataforma .NET.pptx
+++ b/Presentaciones/00. Presentacion - Introduccion a la Plataforma .NET.pptx
@@ -186,6 +186,9 @@
         </p15:guide>
       </p15:sldGuideLst>
     </p:ext>
+    <p:ext uri="{2D200454-40CA-4A62-9FC3-DE9A4176ACB9}">
+      <p15:notesGuideLst xmlns:p15="http://schemas.microsoft.com/office/powerpoint/2012/main"/>
+    </p:ext>
   </p:extLst>
 </p:presentation>
 </file>
@@ -272,7 +275,7 @@
           <a:p>
             <a:fld id="{1B113009-E86D-4EAD-B57C-C146F81250E7}" type="datetimeFigureOut">
               <a:rPr lang="es-AR" smtClean="0"/>
-              <a:t>07/03/2015</a:t>
+              <a:t>11/03/2015</a:t>
             </a:fld>
             <a:endParaRPr lang="es-AR"/>
           </a:p>
@@ -438,7 +441,7 @@
           <a:p>
             <a:fld id="{052CBB1C-CCF2-4176-B982-0B59C5DF6987}" type="datetimeFigureOut">
               <a:rPr lang="es-ES"/>
-              <a:t>07/03/2015</a:t>
+              <a:t>11/03/2015</a:t>
             </a:fld>
             <a:endParaRPr lang="es-ES"/>
           </a:p>
@@ -2599,9 +2602,9 @@
           <a:bodyPr/>
           <a:lstStyle/>
           <a:p>
-            <a:fld id="{43AE47C2-7708-47DB-9FAA-6062AA30ADF6}" type="datetime1">
+            <a:fld id="{52A61F83-72F7-479C-A14A-BCE563A0BC02}" type="datetime1">
               <a:rPr lang="es-ES" smtClean="0"/>
-              <a:t>07/03/2015</a:t>
+              <a:t>11/03/2015</a:t>
             </a:fld>
             <a:endParaRPr lang="es-ES"/>
           </a:p>
@@ -2624,7 +2627,7 @@
           <a:p>
             <a:r>
               <a:rPr lang="es-AR" smtClean="0"/>
-              <a:t>Introducción a la Plataforma .NET – Presentación</a:t>
+              <a:t>La Plataforma de desarrollo .NET – Presentación</a:t>
             </a:r>
             <a:endParaRPr lang="es-ES"/>
           </a:p>
@@ -2790,9 +2793,9 @@
           <a:bodyPr/>
           <a:lstStyle/>
           <a:p>
-            <a:fld id="{59109FB8-2422-49CE-BDF3-E9E550D5764E}" type="datetime1">
+            <a:fld id="{D60F1B8E-25F1-48A0-BCA1-A932200F3155}" type="datetime1">
               <a:rPr lang="es-ES" smtClean="0"/>
-              <a:t>07/03/2015</a:t>
+              <a:t>11/03/2015</a:t>
             </a:fld>
             <a:endParaRPr lang="es-ES"/>
           </a:p>
@@ -2815,7 +2818,7 @@
           <a:p>
             <a:r>
               <a:rPr lang="es-AR" smtClean="0"/>
-              <a:t>Introducción a la Plataforma .NET – Presentación</a:t>
+              <a:t>La Plataforma de desarrollo .NET – Presentación</a:t>
             </a:r>
             <a:endParaRPr lang="es-ES"/>
           </a:p>
@@ -2951,9 +2954,9 @@
           <a:bodyPr/>
           <a:lstStyle/>
           <a:p>
-            <a:fld id="{77926DA7-5D72-4F12-8F2A-F04CC776D223}" type="datetime1">
+            <a:fld id="{48DD4490-0AB7-4CA0-A633-601315B3CDD1}" type="datetime1">
               <a:rPr lang="es-ES" smtClean="0"/>
-              <a:t>07/03/2015</a:t>
+              <a:t>11/03/2015</a:t>
             </a:fld>
             <a:endParaRPr lang="es-ES"/>
           </a:p>
@@ -2976,7 +2979,7 @@
           <a:p>
             <a:r>
               <a:rPr lang="es-AR" smtClean="0"/>
-              <a:t>Introducción a la Plataforma .NET – Presentación</a:t>
+              <a:t>La Plataforma de desarrollo .NET – Presentación</a:t>
             </a:r>
             <a:endParaRPr lang="es-ES"/>
           </a:p>
@@ -4787,9 +4790,9 @@
           <a:bodyPr/>
           <a:lstStyle/>
           <a:p>
-            <a:fld id="{9D01752F-5823-44DB-83D2-46A69D079012}" type="datetime1">
+            <a:fld id="{11BE0A54-056F-451E-B50B-EE4F0C1793D6}" type="datetime1">
               <a:rPr lang="es-ES" smtClean="0"/>
-              <a:t>07/03/2015</a:t>
+              <a:t>11/03/2015</a:t>
             </a:fld>
             <a:endParaRPr lang="es-ES"/>
           </a:p>
@@ -4812,7 +4815,7 @@
           <a:p>
             <a:r>
               <a:rPr lang="es-AR" smtClean="0"/>
-              <a:t>Introducción a la Plataforma .NET – Presentación</a:t>
+              <a:t>La Plataforma de desarrollo .NET – Presentación</a:t>
             </a:r>
             <a:endParaRPr lang="es-ES"/>
           </a:p>
@@ -6667,9 +6670,9 @@
           <a:bodyPr/>
           <a:lstStyle/>
           <a:p>
-            <a:fld id="{416B7652-279E-4D52-8ABB-111C80D6FADB}" type="datetime1">
+            <a:fld id="{D30B4C32-5A43-495E-BED7-524BA8BA428F}" type="datetime1">
               <a:rPr lang="es-ES" smtClean="0"/>
-              <a:t>07/03/2015</a:t>
+              <a:t>11/03/2015</a:t>
             </a:fld>
             <a:endParaRPr lang="es-ES"/>
           </a:p>
@@ -6692,7 +6695,7 @@
           <a:p>
             <a:r>
               <a:rPr lang="es-AR" smtClean="0"/>
-              <a:t>Introducción a la Plataforma .NET – Presentación</a:t>
+              <a:t>La Plataforma de desarrollo .NET – Presentación</a:t>
             </a:r>
             <a:endParaRPr lang="es-ES"/>
           </a:p>
@@ -6790,9 +6793,9 @@
           <a:bodyPr/>
           <a:lstStyle/>
           <a:p>
-            <a:fld id="{610A859C-7503-4066-8AED-5A71E1FE2FC6}" type="datetime1">
+            <a:fld id="{2ECB6861-8E2D-4A6D-9786-F48A47ABE88F}" type="datetime1">
               <a:rPr lang="es-ES" smtClean="0"/>
-              <a:t>07/03/2015</a:t>
+              <a:t>11/03/2015</a:t>
             </a:fld>
             <a:endParaRPr lang="es-ES"/>
           </a:p>
@@ -6815,7 +6818,7 @@
           <a:p>
             <a:r>
               <a:rPr lang="es-AR" smtClean="0"/>
-              <a:t>Introducción a la Plataforma .NET – Presentación</a:t>
+              <a:t>La Plataforma de desarrollo .NET – Presentación</a:t>
             </a:r>
             <a:endParaRPr lang="es-ES"/>
           </a:p>
@@ -7341,9 +7344,9 @@
           <a:bodyPr/>
           <a:lstStyle/>
           <a:p>
-            <a:fld id="{9986FBFC-3386-4C98-9EB6-3E2BEF02CE77}" type="datetime1">
+            <a:fld id="{6C2A504B-FC53-4721-9CFA-2A5F9CAA12E0}" type="datetime1">
               <a:rPr lang="es-ES" smtClean="0"/>
-              <a:t>07/03/2015</a:t>
+              <a:t>11/03/2015</a:t>
             </a:fld>
             <a:endParaRPr lang="es-ES"/>
           </a:p>
@@ -7366,7 +7369,7 @@
           <a:p>
             <a:r>
               <a:rPr lang="es-AR" smtClean="0"/>
-              <a:t>Introducción a la Plataforma .NET – Presentación</a:t>
+              <a:t>La Plataforma de desarrollo .NET – Presentación</a:t>
             </a:r>
             <a:endParaRPr lang="es-ES"/>
           </a:p>
@@ -7464,9 +7467,9 @@
           <a:bodyPr/>
           <a:lstStyle/>
           <a:p>
-            <a:fld id="{65081C53-4D52-4766-9BAC-BBFA0CE04C54}" type="datetime1">
+            <a:fld id="{91DCB11B-2DD6-4DEE-AE65-A4FECB5096D8}" type="datetime1">
               <a:rPr lang="es-ES" smtClean="0"/>
-              <a:t>07/03/2015</a:t>
+              <a:t>11/03/2015</a:t>
             </a:fld>
             <a:endParaRPr lang="es-ES"/>
           </a:p>
@@ -7489,7 +7492,7 @@
           <a:p>
             <a:r>
               <a:rPr lang="es-AR" smtClean="0"/>
-              <a:t>Introducción a la Plataforma .NET – Presentación</a:t>
+              <a:t>La Plataforma de desarrollo .NET – Presentación</a:t>
             </a:r>
             <a:endParaRPr lang="es-ES"/>
           </a:p>
@@ -9185,9 +9188,9 @@
           <a:bodyPr/>
           <a:lstStyle/>
           <a:p>
-            <a:fld id="{D077B5FD-3802-4770-830F-876E7DEFC165}" type="datetime1">
+            <a:fld id="{AB4A191D-FE65-4654-92B1-58F2A1F26B7B}" type="datetime1">
               <a:rPr lang="es-ES" smtClean="0"/>
-              <a:t>07/03/2015</a:t>
+              <a:t>11/03/2015</a:t>
             </a:fld>
             <a:endParaRPr lang="es-ES"/>
           </a:p>
@@ -9210,7 +9213,7 @@
           <a:p>
             <a:r>
               <a:rPr lang="es-AR" smtClean="0"/>
-              <a:t>Introducción a la Plataforma .NET – Presentación</a:t>
+              <a:t>La Plataforma de desarrollo .NET – Presentación</a:t>
             </a:r>
             <a:endParaRPr lang="es-ES"/>
           </a:p>
@@ -9346,9 +9349,9 @@
           <a:bodyPr/>
           <a:lstStyle/>
           <a:p>
-            <a:fld id="{A7766F81-6B91-4FAB-8892-9408234BB9AF}" type="datetime1">
+            <a:fld id="{EAF4253E-0936-46C1-BD6C-F182E32398E6}" type="datetime1">
               <a:rPr lang="es-ES" smtClean="0"/>
-              <a:t>07/03/2015</a:t>
+              <a:t>11/03/2015</a:t>
             </a:fld>
             <a:endParaRPr lang="es-ES"/>
           </a:p>
@@ -9371,7 +9374,7 @@
           <a:p>
             <a:r>
               <a:rPr lang="es-AR" smtClean="0"/>
-              <a:t>Introducción a la Plataforma .NET – Presentación</a:t>
+              <a:t>La Plataforma de desarrollo .NET – Presentación</a:t>
             </a:r>
             <a:endParaRPr lang="es-ES"/>
           </a:p>
@@ -12971,9 +12974,9 @@
           <a:bodyPr/>
           <a:lstStyle/>
           <a:p>
-            <a:fld id="{EF8A5693-A335-447D-AF6B-2D563CE76BE2}" type="datetime1">
+            <a:fld id="{301D9370-9CB6-4C8B-A236-5182B5ACC32D}" type="datetime1">
               <a:rPr lang="es-ES" smtClean="0"/>
-              <a:t>07/03/2015</a:t>
+              <a:t>11/03/2015</a:t>
             </a:fld>
             <a:endParaRPr lang="es-ES"/>
           </a:p>
@@ -12996,7 +12999,7 @@
           <a:p>
             <a:r>
               <a:rPr lang="es-AR" smtClean="0"/>
-              <a:t>Introducción a la Plataforma .NET – Presentación</a:t>
+              <a:t>La Plataforma de desarrollo .NET – Presentación</a:t>
             </a:r>
             <a:endParaRPr lang="es-ES"/>
           </a:p>
@@ -14840,9 +14843,9 @@
             </a:lvl1pPr>
           </a:lstStyle>
           <a:p>
-            <a:fld id="{CFB9D650-81BE-4A06-B1AA-4676F84F2C7D}" type="datetime1">
+            <a:fld id="{4886B32B-A36B-4F56-93DD-E202DABDC4CE}" type="datetime1">
               <a:rPr lang="es-ES" smtClean="0"/>
-              <a:t>07/03/2015</a:t>
+              <a:t>11/03/2015</a:t>
             </a:fld>
             <a:endParaRPr lang="es-ES"/>
           </a:p>
@@ -14880,8 +14883,8 @@
           </a:lstStyle>
           <a:p>
             <a:r>
-              <a:rPr lang="es-ES" dirty="0" smtClean="0"/>
-              <a:t>Introducción a la Plataforma .NET – Presentación</a:t>
+              <a:rPr lang="es-AR" smtClean="0"/>
+              <a:t>La Plataforma de desarrollo .NET – Presentación</a:t>
             </a:r>
             <a:endParaRPr lang="es-ES" dirty="0"/>
           </a:p>
@@ -15010,7 +15013,7 @@
     <p:sldLayoutId id="2147483670" r:id="rId10"/>
     <p:sldLayoutId id="2147483671" r:id="rId11"/>
   </p:sldLayoutIdLst>
-  <p:hf hdr="0"/>
+  <p:hf sldNum="0" hdr="0" dt="0"/>
   <p:txStyles>
     <p:titleStyle>
       <a:lvl1pPr algn="ctr" defTabSz="914400" rtl="0" eaLnBrk="1" latinLnBrk="0" hangingPunct="1">
@@ -15699,29 +15702,6 @@
       </p:sp>
       <p:sp>
         <p:nvSpPr>
-          <p:cNvPr id="3" name="Marcador de fecha 2"/>
-          <p:cNvSpPr>
-            <a:spLocks noGrp="1"/>
-          </p:cNvSpPr>
-          <p:nvPr>
-            <p:ph type="dt" sz="half" idx="10"/>
-          </p:nvPr>
-        </p:nvSpPr>
-        <p:spPr/>
-        <p:txBody>
-          <a:bodyPr/>
-          <a:lstStyle/>
-          <a:p>
-            <a:fld id="{9D01752F-5823-44DB-83D2-46A69D079012}" type="datetime1">
-              <a:rPr lang="es-ES" smtClean="0"/>
-              <a:t>07/03/2015</a:t>
-            </a:fld>
-            <a:endParaRPr lang="es-ES"/>
-          </a:p>
-        </p:txBody>
-      </p:sp>
-      <p:sp>
-        <p:nvSpPr>
           <p:cNvPr id="4" name="Marcador de pie de página 3"/>
           <p:cNvSpPr>
             <a:spLocks noGrp="1"/>
@@ -15737,32 +15717,8 @@
           <a:p>
             <a:r>
               <a:rPr lang="es-AR" smtClean="0"/>
-              <a:t>Introducción a la Plataforma .NET – Presentación</a:t>
-            </a:r>
-            <a:endParaRPr lang="es-ES"/>
-          </a:p>
-        </p:txBody>
-      </p:sp>
-      <p:sp>
-        <p:nvSpPr>
-          <p:cNvPr id="5" name="Marcador de número de diapositiva 4"/>
-          <p:cNvSpPr>
-            <a:spLocks noGrp="1"/>
-          </p:cNvSpPr>
-          <p:nvPr>
-            <p:ph type="sldNum" sz="quarter" idx="12"/>
-          </p:nvPr>
-        </p:nvSpPr>
-        <p:spPr/>
-        <p:txBody>
-          <a:bodyPr/>
-          <a:lstStyle/>
-          <a:p>
-            <a:fld id="{132FADFE-3B8F-471C-ABF0-DBC7717ECBBC}" type="slidenum">
-              <a:rPr lang="es-ES" smtClean="0"/>
-              <a:pPr/>
-              <a:t>10</a:t>
-            </a:fld>
+              <a:t>La Plataforma de desarrollo .NET – Presentación</a:t>
+            </a:r>
             <a:endParaRPr lang="es-ES"/>
           </a:p>
         </p:txBody>
@@ -15846,7 +15802,7 @@
         </p:spPr>
         <p:txBody>
           <a:bodyPr>
-            <a:normAutofit fontScale="92500" lnSpcReduction="10000"/>
+            <a:normAutofit fontScale="92500"/>
           </a:bodyPr>
           <a:lstStyle/>
           <a:p>
@@ -15860,15 +15816,15 @@
             </a:r>
             <a:r>
               <a:rPr lang="es-AR" dirty="0"/>
-              <a:t> </a:t>
-            </a:r>
-            <a:r>
-              <a:rPr lang="es-AR" dirty="0" err="1"/>
-              <a:t>Framework.Para</a:t>
+              <a:t> Framework</a:t>
+            </a:r>
+            <a:r>
+              <a:rPr lang="es-AR" dirty="0" smtClean="0"/>
+              <a:t>. Para </a:t>
             </a:r>
             <a:r>
               <a:rPr lang="es-AR" dirty="0"/>
-              <a:t> qué LINQ .  </a:t>
+              <a:t>qué LINQ .  </a:t>
             </a:r>
             <a:r>
               <a:rPr lang="en-US" dirty="0"/>
@@ -15897,29 +15853,6 @@
           </a:p>
           <a:p>
             <a:endParaRPr lang="es-AR" dirty="0"/>
-          </a:p>
-        </p:txBody>
-      </p:sp>
-      <p:sp>
-        <p:nvSpPr>
-          <p:cNvPr id="3" name="Marcador de fecha 2"/>
-          <p:cNvSpPr>
-            <a:spLocks noGrp="1"/>
-          </p:cNvSpPr>
-          <p:nvPr>
-            <p:ph type="dt" sz="half" idx="10"/>
-          </p:nvPr>
-        </p:nvSpPr>
-        <p:spPr/>
-        <p:txBody>
-          <a:bodyPr/>
-          <a:lstStyle/>
-          <a:p>
-            <a:fld id="{9D01752F-5823-44DB-83D2-46A69D079012}" type="datetime1">
-              <a:rPr lang="es-ES" smtClean="0"/>
-              <a:t>07/03/2015</a:t>
-            </a:fld>
-            <a:endParaRPr lang="es-ES"/>
           </a:p>
         </p:txBody>
       </p:sp>
@@ -15940,32 +15873,8 @@
           <a:p>
             <a:r>
               <a:rPr lang="es-AR" smtClean="0"/>
-              <a:t>Introducción a la Plataforma .NET – Presentación</a:t>
-            </a:r>
-            <a:endParaRPr lang="es-ES"/>
-          </a:p>
-        </p:txBody>
-      </p:sp>
-      <p:sp>
-        <p:nvSpPr>
-          <p:cNvPr id="5" name="Marcador de número de diapositiva 4"/>
-          <p:cNvSpPr>
-            <a:spLocks noGrp="1"/>
-          </p:cNvSpPr>
-          <p:nvPr>
-            <p:ph type="sldNum" sz="quarter" idx="12"/>
-          </p:nvPr>
-        </p:nvSpPr>
-        <p:spPr/>
-        <p:txBody>
-          <a:bodyPr/>
-          <a:lstStyle/>
-          <a:p>
-            <a:fld id="{132FADFE-3B8F-471C-ABF0-DBC7717ECBBC}" type="slidenum">
-              <a:rPr lang="es-ES" smtClean="0"/>
-              <a:pPr/>
-              <a:t>11</a:t>
-            </a:fld>
+              <a:t>La Plataforma de desarrollo .NET – Presentación</a:t>
+            </a:r>
             <a:endParaRPr lang="es-ES"/>
           </a:p>
         </p:txBody>
@@ -16343,29 +16252,6 @@
       </p:sp>
       <p:sp>
         <p:nvSpPr>
-          <p:cNvPr id="3" name="2 Marcador de fecha"/>
-          <p:cNvSpPr>
-            <a:spLocks noGrp="1"/>
-          </p:cNvSpPr>
-          <p:nvPr>
-            <p:ph type="dt" sz="half" idx="10"/>
-          </p:nvPr>
-        </p:nvSpPr>
-        <p:spPr/>
-        <p:txBody>
-          <a:bodyPr/>
-          <a:lstStyle/>
-          <a:p>
-            <a:fld id="{9D01752F-5823-44DB-83D2-46A69D079012}" type="datetime1">
-              <a:rPr lang="es-ES" smtClean="0"/>
-              <a:t>07/03/2015</a:t>
-            </a:fld>
-            <a:endParaRPr lang="es-ES"/>
-          </a:p>
-        </p:txBody>
-      </p:sp>
-      <p:sp>
-        <p:nvSpPr>
           <p:cNvPr id="4" name="3 Marcador de pie de página"/>
           <p:cNvSpPr>
             <a:spLocks noGrp="1"/>
@@ -16381,32 +16267,8 @@
           <a:p>
             <a:r>
               <a:rPr lang="es-AR" smtClean="0"/>
-              <a:t>Introducción a la Plataforma .NET – Presentación</a:t>
-            </a:r>
-            <a:endParaRPr lang="es-ES"/>
-          </a:p>
-        </p:txBody>
-      </p:sp>
-      <p:sp>
-        <p:nvSpPr>
-          <p:cNvPr id="5" name="4 Marcador de número de diapositiva"/>
-          <p:cNvSpPr>
-            <a:spLocks noGrp="1"/>
-          </p:cNvSpPr>
-          <p:nvPr>
-            <p:ph type="sldNum" sz="quarter" idx="12"/>
-          </p:nvPr>
-        </p:nvSpPr>
-        <p:spPr/>
-        <p:txBody>
-          <a:bodyPr/>
-          <a:lstStyle/>
-          <a:p>
-            <a:fld id="{132FADFE-3B8F-471C-ABF0-DBC7717ECBBC}" type="slidenum">
-              <a:rPr lang="es-ES" smtClean="0"/>
-              <a:pPr/>
-              <a:t>12</a:t>
-            </a:fld>
+              <a:t>La Plataforma de desarrollo .NET – Presentación</a:t>
+            </a:r>
             <a:endParaRPr lang="es-ES"/>
           </a:p>
         </p:txBody>
@@ -16531,29 +16393,6 @@
       </p:sp>
       <p:sp>
         <p:nvSpPr>
-          <p:cNvPr id="3" name="Marcador de fecha 2"/>
-          <p:cNvSpPr>
-            <a:spLocks noGrp="1"/>
-          </p:cNvSpPr>
-          <p:nvPr>
-            <p:ph type="dt" sz="half" idx="10"/>
-          </p:nvPr>
-        </p:nvSpPr>
-        <p:spPr/>
-        <p:txBody>
-          <a:bodyPr/>
-          <a:lstStyle/>
-          <a:p>
-            <a:fld id="{9D01752F-5823-44DB-83D2-46A69D079012}" type="datetime1">
-              <a:rPr lang="es-ES" smtClean="0"/>
-              <a:t>07/03/2015</a:t>
-            </a:fld>
-            <a:endParaRPr lang="es-ES"/>
-          </a:p>
-        </p:txBody>
-      </p:sp>
-      <p:sp>
-        <p:nvSpPr>
           <p:cNvPr id="4" name="Marcador de pie de página 3"/>
           <p:cNvSpPr>
             <a:spLocks noGrp="1"/>
@@ -16569,32 +16408,8 @@
           <a:p>
             <a:r>
               <a:rPr lang="es-AR" smtClean="0"/>
-              <a:t>Introducción a la Plataforma .NET – Presentación</a:t>
-            </a:r>
-            <a:endParaRPr lang="es-ES"/>
-          </a:p>
-        </p:txBody>
-      </p:sp>
-      <p:sp>
-        <p:nvSpPr>
-          <p:cNvPr id="5" name="Marcador de número de diapositiva 4"/>
-          <p:cNvSpPr>
-            <a:spLocks noGrp="1"/>
-          </p:cNvSpPr>
-          <p:nvPr>
-            <p:ph type="sldNum" sz="quarter" idx="12"/>
-          </p:nvPr>
-        </p:nvSpPr>
-        <p:spPr/>
-        <p:txBody>
-          <a:bodyPr/>
-          <a:lstStyle/>
-          <a:p>
-            <a:fld id="{132FADFE-3B8F-471C-ABF0-DBC7717ECBBC}" type="slidenum">
-              <a:rPr lang="es-ES" smtClean="0"/>
-              <a:pPr/>
-              <a:t>13</a:t>
-            </a:fld>
+              <a:t>La Plataforma de desarrollo .NET – Presentación</a:t>
+            </a:r>
             <a:endParaRPr lang="es-ES"/>
           </a:p>
         </p:txBody>
@@ -16780,29 +16595,6 @@
       </p:sp>
       <p:sp>
         <p:nvSpPr>
-          <p:cNvPr id="3" name="Marcador de fecha 2"/>
-          <p:cNvSpPr>
-            <a:spLocks noGrp="1"/>
-          </p:cNvSpPr>
-          <p:nvPr>
-            <p:ph type="dt" sz="half" idx="10"/>
-          </p:nvPr>
-        </p:nvSpPr>
-        <p:spPr/>
-        <p:txBody>
-          <a:bodyPr/>
-          <a:lstStyle/>
-          <a:p>
-            <a:fld id="{9D01752F-5823-44DB-83D2-46A69D079012}" type="datetime1">
-              <a:rPr lang="es-ES" smtClean="0"/>
-              <a:t>07/03/2015</a:t>
-            </a:fld>
-            <a:endParaRPr lang="es-ES"/>
-          </a:p>
-        </p:txBody>
-      </p:sp>
-      <p:sp>
-        <p:nvSpPr>
           <p:cNvPr id="4" name="Marcador de pie de página 3"/>
           <p:cNvSpPr>
             <a:spLocks noGrp="1"/>
@@ -16818,32 +16610,8 @@
           <a:p>
             <a:r>
               <a:rPr lang="es-AR" smtClean="0"/>
-              <a:t>Introducción a la Plataforma .NET – Presentación</a:t>
-            </a:r>
-            <a:endParaRPr lang="es-ES"/>
-          </a:p>
-        </p:txBody>
-      </p:sp>
-      <p:sp>
-        <p:nvSpPr>
-          <p:cNvPr id="5" name="Marcador de número de diapositiva 4"/>
-          <p:cNvSpPr>
-            <a:spLocks noGrp="1"/>
-          </p:cNvSpPr>
-          <p:nvPr>
-            <p:ph type="sldNum" sz="quarter" idx="12"/>
-          </p:nvPr>
-        </p:nvSpPr>
-        <p:spPr/>
-        <p:txBody>
-          <a:bodyPr/>
-          <a:lstStyle/>
-          <a:p>
-            <a:fld id="{132FADFE-3B8F-471C-ABF0-DBC7717ECBBC}" type="slidenum">
-              <a:rPr lang="es-ES" smtClean="0"/>
-              <a:pPr/>
-              <a:t>14</a:t>
-            </a:fld>
+              <a:t>La Plataforma de desarrollo .NET – Presentación</a:t>
+            </a:r>
             <a:endParaRPr lang="es-ES"/>
           </a:p>
         </p:txBody>
@@ -17021,29 +16789,6 @@
       </p:sp>
       <p:sp>
         <p:nvSpPr>
-          <p:cNvPr id="3" name="Marcador de fecha 2"/>
-          <p:cNvSpPr>
-            <a:spLocks noGrp="1"/>
-          </p:cNvSpPr>
-          <p:nvPr>
-            <p:ph type="dt" sz="half" idx="10"/>
-          </p:nvPr>
-        </p:nvSpPr>
-        <p:spPr/>
-        <p:txBody>
-          <a:bodyPr/>
-          <a:lstStyle/>
-          <a:p>
-            <a:fld id="{9D01752F-5823-44DB-83D2-46A69D079012}" type="datetime1">
-              <a:rPr lang="es-ES" smtClean="0"/>
-              <a:t>07/03/2015</a:t>
-            </a:fld>
-            <a:endParaRPr lang="es-ES"/>
-          </a:p>
-        </p:txBody>
-      </p:sp>
-      <p:sp>
-        <p:nvSpPr>
           <p:cNvPr id="4" name="Marcador de pie de página 3"/>
           <p:cNvSpPr>
             <a:spLocks noGrp="1"/>
@@ -17059,32 +16804,8 @@
           <a:p>
             <a:r>
               <a:rPr lang="es-AR" smtClean="0"/>
-              <a:t>Introducción a la Plataforma .NET – Presentación</a:t>
-            </a:r>
-            <a:endParaRPr lang="es-ES"/>
-          </a:p>
-        </p:txBody>
-      </p:sp>
-      <p:sp>
-        <p:nvSpPr>
-          <p:cNvPr id="5" name="Marcador de número de diapositiva 4"/>
-          <p:cNvSpPr>
-            <a:spLocks noGrp="1"/>
-          </p:cNvSpPr>
-          <p:nvPr>
-            <p:ph type="sldNum" sz="quarter" idx="12"/>
-          </p:nvPr>
-        </p:nvSpPr>
-        <p:spPr/>
-        <p:txBody>
-          <a:bodyPr/>
-          <a:lstStyle/>
-          <a:p>
-            <a:fld id="{132FADFE-3B8F-471C-ABF0-DBC7717ECBBC}" type="slidenum">
-              <a:rPr lang="es-ES" smtClean="0"/>
-              <a:pPr/>
-              <a:t>15</a:t>
-            </a:fld>
+              <a:t>La Plataforma de desarrollo .NET – Presentación</a:t>
+            </a:r>
             <a:endParaRPr lang="es-ES"/>
           </a:p>
         </p:txBody>
@@ -17108,11 +16829,15 @@
           <a:p>
             <a:r>
               <a:rPr lang="es-AR" dirty="0"/>
-              <a:t>Unidad 6: La Capa de presentación: WPF, MVC, </a:t>
+              <a:t>Unidad 6: La Capa de presentación: WPF, </a:t>
             </a:r>
             <a:r>
               <a:rPr lang="es-AR" dirty="0" smtClean="0"/>
-              <a:t>Silverlight</a:t>
+              <a:t>MVC</a:t>
+            </a:r>
+            <a:r>
+              <a:rPr lang="es-AR" dirty="0"/>
+              <a:t>.</a:t>
             </a:r>
             <a:endParaRPr lang="es-AR" dirty="0"/>
           </a:p>
@@ -17158,7 +16883,7 @@
         </p:blipFill>
         <p:spPr>
           <a:xfrm>
-            <a:off x="6769733" y="3424822"/>
+            <a:off x="6818026" y="4653136"/>
             <a:ext cx="1784435" cy="955947"/>
           </a:xfrm>
           <a:prstGeom prst="rect">
@@ -17487,29 +17212,6 @@
       </p:sp>
       <p:sp>
         <p:nvSpPr>
-          <p:cNvPr id="3" name="2 Marcador de fecha"/>
-          <p:cNvSpPr>
-            <a:spLocks noGrp="1"/>
-          </p:cNvSpPr>
-          <p:nvPr>
-            <p:ph type="dt" sz="half" idx="10"/>
-          </p:nvPr>
-        </p:nvSpPr>
-        <p:spPr/>
-        <p:txBody>
-          <a:bodyPr/>
-          <a:lstStyle/>
-          <a:p>
-            <a:fld id="{9D01752F-5823-44DB-83D2-46A69D079012}" type="datetime1">
-              <a:rPr lang="es-ES" smtClean="0"/>
-              <a:t>07/03/2015</a:t>
-            </a:fld>
-            <a:endParaRPr lang="es-ES"/>
-          </a:p>
-        </p:txBody>
-      </p:sp>
-      <p:sp>
-        <p:nvSpPr>
           <p:cNvPr id="4" name="3 Marcador de pie de página"/>
           <p:cNvSpPr>
             <a:spLocks noGrp="1"/>
@@ -17525,32 +17227,8 @@
           <a:p>
             <a:r>
               <a:rPr lang="es-AR" smtClean="0"/>
-              <a:t>Introducción a la Plataforma .NET – Presentación</a:t>
-            </a:r>
-            <a:endParaRPr lang="es-ES"/>
-          </a:p>
-        </p:txBody>
-      </p:sp>
-      <p:sp>
-        <p:nvSpPr>
-          <p:cNvPr id="5" name="4 Marcador de número de diapositiva"/>
-          <p:cNvSpPr>
-            <a:spLocks noGrp="1"/>
-          </p:cNvSpPr>
-          <p:nvPr>
-            <p:ph type="sldNum" sz="quarter" idx="12"/>
-          </p:nvPr>
-        </p:nvSpPr>
-        <p:spPr/>
-        <p:txBody>
-          <a:bodyPr/>
-          <a:lstStyle/>
-          <a:p>
-            <a:fld id="{132FADFE-3B8F-471C-ABF0-DBC7717ECBBC}" type="slidenum">
-              <a:rPr lang="es-ES" smtClean="0"/>
-              <a:pPr/>
-              <a:t>16</a:t>
-            </a:fld>
+              <a:t>La Plataforma de desarrollo .NET – Presentación</a:t>
+            </a:r>
             <a:endParaRPr lang="es-ES"/>
           </a:p>
         </p:txBody>
@@ -17574,8 +17252,17 @@
           <a:p>
             <a:r>
               <a:rPr lang="es-AR" dirty="0"/>
-              <a:t>Unidad 6: La Capa de presentación: WPF, MVC, Silverlight</a:t>
-            </a:r>
+              <a:t>Unidad 6: La Capa de presentación: WPF, </a:t>
+            </a:r>
+            <a:r>
+              <a:rPr lang="es-AR" dirty="0" smtClean="0"/>
+              <a:t>MVC</a:t>
+            </a:r>
+            <a:r>
+              <a:rPr lang="es-AR" dirty="0"/>
+              <a:t>.</a:t>
+            </a:r>
+            <a:endParaRPr lang="es-AR" dirty="0"/>
           </a:p>
         </p:txBody>
       </p:sp>
@@ -17680,29 +17367,6 @@
       </p:sp>
       <p:sp>
         <p:nvSpPr>
-          <p:cNvPr id="3" name="Marcador de fecha 2"/>
-          <p:cNvSpPr>
-            <a:spLocks noGrp="1"/>
-          </p:cNvSpPr>
-          <p:nvPr>
-            <p:ph type="dt" sz="half" idx="10"/>
-          </p:nvPr>
-        </p:nvSpPr>
-        <p:spPr/>
-        <p:txBody>
-          <a:bodyPr/>
-          <a:lstStyle/>
-          <a:p>
-            <a:fld id="{9D01752F-5823-44DB-83D2-46A69D079012}" type="datetime1">
-              <a:rPr lang="es-ES" smtClean="0"/>
-              <a:t>07/03/2015</a:t>
-            </a:fld>
-            <a:endParaRPr lang="es-ES"/>
-          </a:p>
-        </p:txBody>
-      </p:sp>
-      <p:sp>
-        <p:nvSpPr>
           <p:cNvPr id="4" name="Marcador de pie de página 3"/>
           <p:cNvSpPr>
             <a:spLocks noGrp="1"/>
@@ -17718,32 +17382,8 @@
           <a:p>
             <a:r>
               <a:rPr lang="es-AR" smtClean="0"/>
-              <a:t>Introducción a la Plataforma .NET – Presentación</a:t>
-            </a:r>
-            <a:endParaRPr lang="es-ES"/>
-          </a:p>
-        </p:txBody>
-      </p:sp>
-      <p:sp>
-        <p:nvSpPr>
-          <p:cNvPr id="5" name="Marcador de número de diapositiva 4"/>
-          <p:cNvSpPr>
-            <a:spLocks noGrp="1"/>
-          </p:cNvSpPr>
-          <p:nvPr>
-            <p:ph type="sldNum" sz="quarter" idx="12"/>
-          </p:nvPr>
-        </p:nvSpPr>
-        <p:spPr/>
-        <p:txBody>
-          <a:bodyPr/>
-          <a:lstStyle/>
-          <a:p>
-            <a:fld id="{132FADFE-3B8F-471C-ABF0-DBC7717ECBBC}" type="slidenum">
-              <a:rPr lang="es-ES" smtClean="0"/>
-              <a:pPr/>
-              <a:t>17</a:t>
-            </a:fld>
+              <a:t>La Plataforma de desarrollo .NET – Presentación</a:t>
+            </a:r>
             <a:endParaRPr lang="es-ES"/>
           </a:p>
         </p:txBody>
@@ -17993,29 +17633,6 @@
       </p:sp>
       <p:sp>
         <p:nvSpPr>
-          <p:cNvPr id="3" name="2 Marcador de fecha"/>
-          <p:cNvSpPr>
-            <a:spLocks noGrp="1"/>
-          </p:cNvSpPr>
-          <p:nvPr>
-            <p:ph type="dt" sz="half" idx="10"/>
-          </p:nvPr>
-        </p:nvSpPr>
-        <p:spPr/>
-        <p:txBody>
-          <a:bodyPr/>
-          <a:lstStyle/>
-          <a:p>
-            <a:fld id="{9D01752F-5823-44DB-83D2-46A69D079012}" type="datetime1">
-              <a:rPr lang="es-ES" smtClean="0"/>
-              <a:t>07/03/2015</a:t>
-            </a:fld>
-            <a:endParaRPr lang="es-ES"/>
-          </a:p>
-        </p:txBody>
-      </p:sp>
-      <p:sp>
-        <p:nvSpPr>
           <p:cNvPr id="4" name="3 Marcador de pie de página"/>
           <p:cNvSpPr>
             <a:spLocks noGrp="1"/>
@@ -18031,32 +17648,8 @@
           <a:p>
             <a:r>
               <a:rPr lang="es-AR" smtClean="0"/>
-              <a:t>Introducción a la Plataforma .NET – Presentación</a:t>
-            </a:r>
-            <a:endParaRPr lang="es-ES"/>
-          </a:p>
-        </p:txBody>
-      </p:sp>
-      <p:sp>
-        <p:nvSpPr>
-          <p:cNvPr id="5" name="4 Marcador de número de diapositiva"/>
-          <p:cNvSpPr>
-            <a:spLocks noGrp="1"/>
-          </p:cNvSpPr>
-          <p:nvPr>
-            <p:ph type="sldNum" sz="quarter" idx="12"/>
-          </p:nvPr>
-        </p:nvSpPr>
-        <p:spPr/>
-        <p:txBody>
-          <a:bodyPr/>
-          <a:lstStyle/>
-          <a:p>
-            <a:fld id="{132FADFE-3B8F-471C-ABF0-DBC7717ECBBC}" type="slidenum">
-              <a:rPr lang="es-ES" smtClean="0"/>
-              <a:pPr/>
-              <a:t>18</a:t>
-            </a:fld>
+              <a:t>La Plataforma de desarrollo .NET – Presentación</a:t>
+            </a:r>
             <a:endParaRPr lang="es-ES"/>
           </a:p>
         </p:txBody>
@@ -18163,8 +17756,8 @@
               <a:t>, </a:t>
             </a:r>
             <a:r>
-              <a:rPr lang="es-AR" dirty="0" err="1"/>
-              <a:t>Criptagrafia</a:t>
+              <a:rPr lang="es-AR" dirty="0" err="1" smtClean="0"/>
+              <a:t>Criptografia</a:t>
             </a:r>
             <a:r>
               <a:rPr lang="es-AR" dirty="0"/>
@@ -18200,29 +17793,6 @@
               <a:buNone/>
             </a:pPr>
             <a:endParaRPr lang="es-AR" dirty="0"/>
-          </a:p>
-        </p:txBody>
-      </p:sp>
-      <p:sp>
-        <p:nvSpPr>
-          <p:cNvPr id="3" name="Marcador de fecha 2"/>
-          <p:cNvSpPr>
-            <a:spLocks noGrp="1"/>
-          </p:cNvSpPr>
-          <p:nvPr>
-            <p:ph type="dt" sz="half" idx="10"/>
-          </p:nvPr>
-        </p:nvSpPr>
-        <p:spPr/>
-        <p:txBody>
-          <a:bodyPr/>
-          <a:lstStyle/>
-          <a:p>
-            <a:fld id="{9D01752F-5823-44DB-83D2-46A69D079012}" type="datetime1">
-              <a:rPr lang="es-ES" smtClean="0"/>
-              <a:t>07/03/2015</a:t>
-            </a:fld>
-            <a:endParaRPr lang="es-ES"/>
           </a:p>
         </p:txBody>
       </p:sp>
@@ -18243,32 +17813,8 @@
           <a:p>
             <a:r>
               <a:rPr lang="es-AR" smtClean="0"/>
-              <a:t>Introducción a la Plataforma .NET – Presentación</a:t>
-            </a:r>
-            <a:endParaRPr lang="es-ES"/>
-          </a:p>
-        </p:txBody>
-      </p:sp>
-      <p:sp>
-        <p:nvSpPr>
-          <p:cNvPr id="5" name="Marcador de número de diapositiva 4"/>
-          <p:cNvSpPr>
-            <a:spLocks noGrp="1"/>
-          </p:cNvSpPr>
-          <p:nvPr>
-            <p:ph type="sldNum" sz="quarter" idx="12"/>
-          </p:nvPr>
-        </p:nvSpPr>
-        <p:spPr/>
-        <p:txBody>
-          <a:bodyPr/>
-          <a:lstStyle/>
-          <a:p>
-            <a:fld id="{132FADFE-3B8F-471C-ABF0-DBC7717ECBBC}" type="slidenum">
-              <a:rPr lang="es-ES" smtClean="0"/>
-              <a:pPr/>
-              <a:t>19</a:t>
-            </a:fld>
+              <a:t>La Plataforma de desarrollo .NET – Presentación</a:t>
+            </a:r>
             <a:endParaRPr lang="es-ES"/>
           </a:p>
         </p:txBody>
@@ -18483,29 +18029,6 @@
       </p:sp>
       <p:sp>
         <p:nvSpPr>
-          <p:cNvPr id="4" name="3 Marcador de fecha"/>
-          <p:cNvSpPr>
-            <a:spLocks noGrp="1"/>
-          </p:cNvSpPr>
-          <p:nvPr>
-            <p:ph type="dt" sz="half" idx="10"/>
-          </p:nvPr>
-        </p:nvSpPr>
-        <p:spPr/>
-        <p:txBody>
-          <a:bodyPr/>
-          <a:lstStyle/>
-          <a:p>
-            <a:fld id="{B5E824A0-33F3-477E-B03A-23AA2F6B69F3}" type="datetime1">
-              <a:rPr lang="es-ES" smtClean="0"/>
-              <a:t>07/03/2015</a:t>
-            </a:fld>
-            <a:endParaRPr lang="es-ES"/>
-          </a:p>
-        </p:txBody>
-      </p:sp>
-      <p:sp>
-        <p:nvSpPr>
           <p:cNvPr id="5" name="4 Marcador de pie de página"/>
           <p:cNvSpPr>
             <a:spLocks noGrp="1"/>
@@ -18521,32 +18044,8 @@
           <a:p>
             <a:r>
               <a:rPr lang="es-AR" smtClean="0"/>
-              <a:t>Introducción a la Plataforma .NET – Presentación</a:t>
-            </a:r>
-            <a:endParaRPr lang="es-ES"/>
-          </a:p>
-        </p:txBody>
-      </p:sp>
-      <p:sp>
-        <p:nvSpPr>
-          <p:cNvPr id="6" name="5 Marcador de número de diapositiva"/>
-          <p:cNvSpPr>
-            <a:spLocks noGrp="1"/>
-          </p:cNvSpPr>
-          <p:nvPr>
-            <p:ph type="sldNum" sz="quarter" idx="12"/>
-          </p:nvPr>
-        </p:nvSpPr>
-        <p:spPr/>
-        <p:txBody>
-          <a:bodyPr/>
-          <a:lstStyle/>
-          <a:p>
-            <a:fld id="{132FADFE-3B8F-471C-ABF0-DBC7717ECBBC}" type="slidenum">
-              <a:rPr lang="es-ES" smtClean="0"/>
-              <a:pPr/>
-              <a:t>2</a:t>
-            </a:fld>
+              <a:t>La Plataforma de desarrollo .NET – Presentación</a:t>
+            </a:r>
             <a:endParaRPr lang="es-ES"/>
           </a:p>
         </p:txBody>
@@ -18784,29 +18283,6 @@
       </p:sp>
       <p:sp>
         <p:nvSpPr>
-          <p:cNvPr id="3" name="2 Marcador de fecha"/>
-          <p:cNvSpPr>
-            <a:spLocks noGrp="1"/>
-          </p:cNvSpPr>
-          <p:nvPr>
-            <p:ph type="dt" sz="half" idx="10"/>
-          </p:nvPr>
-        </p:nvSpPr>
-        <p:spPr/>
-        <p:txBody>
-          <a:bodyPr/>
-          <a:lstStyle/>
-          <a:p>
-            <a:fld id="{9D01752F-5823-44DB-83D2-46A69D079012}" type="datetime1">
-              <a:rPr lang="es-ES" smtClean="0"/>
-              <a:t>07/03/2015</a:t>
-            </a:fld>
-            <a:endParaRPr lang="es-ES"/>
-          </a:p>
-        </p:txBody>
-      </p:sp>
-      <p:sp>
-        <p:nvSpPr>
           <p:cNvPr id="4" name="3 Marcador de pie de página"/>
           <p:cNvSpPr>
             <a:spLocks noGrp="1"/>
@@ -18822,32 +18298,8 @@
           <a:p>
             <a:r>
               <a:rPr lang="es-AR" smtClean="0"/>
-              <a:t>Introducción a la Plataforma .NET – Presentación</a:t>
-            </a:r>
-            <a:endParaRPr lang="es-ES"/>
-          </a:p>
-        </p:txBody>
-      </p:sp>
-      <p:sp>
-        <p:nvSpPr>
-          <p:cNvPr id="5" name="4 Marcador de número de diapositiva"/>
-          <p:cNvSpPr>
-            <a:spLocks noGrp="1"/>
-          </p:cNvSpPr>
-          <p:nvPr>
-            <p:ph type="sldNum" sz="quarter" idx="12"/>
-          </p:nvPr>
-        </p:nvSpPr>
-        <p:spPr/>
-        <p:txBody>
-          <a:bodyPr/>
-          <a:lstStyle/>
-          <a:p>
-            <a:fld id="{132FADFE-3B8F-471C-ABF0-DBC7717ECBBC}" type="slidenum">
-              <a:rPr lang="es-ES" smtClean="0"/>
-              <a:pPr/>
-              <a:t>20</a:t>
-            </a:fld>
+              <a:t>La Plataforma de desarrollo .NET – Presentación</a:t>
+            </a:r>
             <a:endParaRPr lang="es-ES"/>
           </a:p>
         </p:txBody>
@@ -18958,29 +18410,6 @@
       </p:sp>
       <p:sp>
         <p:nvSpPr>
-          <p:cNvPr id="3" name="Marcador de fecha 2"/>
-          <p:cNvSpPr>
-            <a:spLocks noGrp="1"/>
-          </p:cNvSpPr>
-          <p:nvPr>
-            <p:ph type="dt" sz="half" idx="10"/>
-          </p:nvPr>
-        </p:nvSpPr>
-        <p:spPr/>
-        <p:txBody>
-          <a:bodyPr/>
-          <a:lstStyle/>
-          <a:p>
-            <a:fld id="{9D01752F-5823-44DB-83D2-46A69D079012}" type="datetime1">
-              <a:rPr lang="es-ES" smtClean="0"/>
-              <a:t>07/03/2015</a:t>
-            </a:fld>
-            <a:endParaRPr lang="es-ES"/>
-          </a:p>
-        </p:txBody>
-      </p:sp>
-      <p:sp>
-        <p:nvSpPr>
           <p:cNvPr id="4" name="Marcador de pie de página 3"/>
           <p:cNvSpPr>
             <a:spLocks noGrp="1"/>
@@ -18996,32 +18425,8 @@
           <a:p>
             <a:r>
               <a:rPr lang="es-AR" smtClean="0"/>
-              <a:t>Introducción a la Plataforma .NET – Presentación</a:t>
-            </a:r>
-            <a:endParaRPr lang="es-ES"/>
-          </a:p>
-        </p:txBody>
-      </p:sp>
-      <p:sp>
-        <p:nvSpPr>
-          <p:cNvPr id="5" name="Marcador de número de diapositiva 4"/>
-          <p:cNvSpPr>
-            <a:spLocks noGrp="1"/>
-          </p:cNvSpPr>
-          <p:nvPr>
-            <p:ph type="sldNum" sz="quarter" idx="12"/>
-          </p:nvPr>
-        </p:nvSpPr>
-        <p:spPr/>
-        <p:txBody>
-          <a:bodyPr/>
-          <a:lstStyle/>
-          <a:p>
-            <a:fld id="{132FADFE-3B8F-471C-ABF0-DBC7717ECBBC}" type="slidenum">
-              <a:rPr lang="es-ES" smtClean="0"/>
-              <a:pPr/>
-              <a:t>21</a:t>
-            </a:fld>
+              <a:t>La Plataforma de desarrollo .NET – Presentación</a:t>
+            </a:r>
             <a:endParaRPr lang="es-ES"/>
           </a:p>
         </p:txBody>
@@ -19363,29 +18768,6 @@
       </p:sp>
       <p:sp>
         <p:nvSpPr>
-          <p:cNvPr id="3" name="2 Marcador de fecha"/>
-          <p:cNvSpPr>
-            <a:spLocks noGrp="1"/>
-          </p:cNvSpPr>
-          <p:nvPr>
-            <p:ph type="dt" sz="half" idx="10"/>
-          </p:nvPr>
-        </p:nvSpPr>
-        <p:spPr/>
-        <p:txBody>
-          <a:bodyPr/>
-          <a:lstStyle/>
-          <a:p>
-            <a:fld id="{9D01752F-5823-44DB-83D2-46A69D079012}" type="datetime1">
-              <a:rPr lang="es-ES" smtClean="0"/>
-              <a:t>07/03/2015</a:t>
-            </a:fld>
-            <a:endParaRPr lang="es-ES"/>
-          </a:p>
-        </p:txBody>
-      </p:sp>
-      <p:sp>
-        <p:nvSpPr>
           <p:cNvPr id="4" name="3 Marcador de pie de página"/>
           <p:cNvSpPr>
             <a:spLocks noGrp="1"/>
@@ -19401,32 +18783,8 @@
           <a:p>
             <a:r>
               <a:rPr lang="es-AR" smtClean="0"/>
-              <a:t>Introducción a la Plataforma .NET – Presentación</a:t>
-            </a:r>
-            <a:endParaRPr lang="es-ES"/>
-          </a:p>
-        </p:txBody>
-      </p:sp>
-      <p:sp>
-        <p:nvSpPr>
-          <p:cNvPr id="5" name="4 Marcador de número de diapositiva"/>
-          <p:cNvSpPr>
-            <a:spLocks noGrp="1"/>
-          </p:cNvSpPr>
-          <p:nvPr>
-            <p:ph type="sldNum" sz="quarter" idx="12"/>
-          </p:nvPr>
-        </p:nvSpPr>
-        <p:spPr/>
-        <p:txBody>
-          <a:bodyPr/>
-          <a:lstStyle/>
-          <a:p>
-            <a:fld id="{132FADFE-3B8F-471C-ABF0-DBC7717ECBBC}" type="slidenum">
-              <a:rPr lang="es-ES" smtClean="0"/>
-              <a:pPr/>
-              <a:t>22</a:t>
-            </a:fld>
+              <a:t>La Plataforma de desarrollo .NET – Presentación</a:t>
+            </a:r>
             <a:endParaRPr lang="es-ES"/>
           </a:p>
         </p:txBody>
@@ -19526,29 +18884,6 @@
       </p:sp>
       <p:sp>
         <p:nvSpPr>
-          <p:cNvPr id="3" name="Marcador de fecha 2"/>
-          <p:cNvSpPr>
-            <a:spLocks noGrp="1"/>
-          </p:cNvSpPr>
-          <p:nvPr>
-            <p:ph type="dt" sz="half" idx="10"/>
-          </p:nvPr>
-        </p:nvSpPr>
-        <p:spPr/>
-        <p:txBody>
-          <a:bodyPr/>
-          <a:lstStyle/>
-          <a:p>
-            <a:fld id="{9D01752F-5823-44DB-83D2-46A69D079012}" type="datetime1">
-              <a:rPr lang="es-ES" smtClean="0"/>
-              <a:t>07/03/2015</a:t>
-            </a:fld>
-            <a:endParaRPr lang="es-ES"/>
-          </a:p>
-        </p:txBody>
-      </p:sp>
-      <p:sp>
-        <p:nvSpPr>
           <p:cNvPr id="4" name="Marcador de pie de página 3"/>
           <p:cNvSpPr>
             <a:spLocks noGrp="1"/>
@@ -19564,32 +18899,8 @@
           <a:p>
             <a:r>
               <a:rPr lang="es-AR" smtClean="0"/>
-              <a:t>Introducción a la Plataforma .NET – Presentación</a:t>
-            </a:r>
-            <a:endParaRPr lang="es-ES"/>
-          </a:p>
-        </p:txBody>
-      </p:sp>
-      <p:sp>
-        <p:nvSpPr>
-          <p:cNvPr id="5" name="Marcador de número de diapositiva 4"/>
-          <p:cNvSpPr>
-            <a:spLocks noGrp="1"/>
-          </p:cNvSpPr>
-          <p:nvPr>
-            <p:ph type="sldNum" sz="quarter" idx="12"/>
-          </p:nvPr>
-        </p:nvSpPr>
-        <p:spPr/>
-        <p:txBody>
-          <a:bodyPr/>
-          <a:lstStyle/>
-          <a:p>
-            <a:fld id="{132FADFE-3B8F-471C-ABF0-DBC7717ECBBC}" type="slidenum">
-              <a:rPr lang="es-ES" smtClean="0"/>
-              <a:pPr/>
-              <a:t>23</a:t>
-            </a:fld>
+              <a:t>La Plataforma de desarrollo .NET – Presentación</a:t>
+            </a:r>
             <a:endParaRPr lang="es-ES"/>
           </a:p>
         </p:txBody>
@@ -19847,29 +19158,6 @@
       </p:sp>
       <p:sp>
         <p:nvSpPr>
-          <p:cNvPr id="3" name="2 Marcador de fecha"/>
-          <p:cNvSpPr>
-            <a:spLocks noGrp="1"/>
-          </p:cNvSpPr>
-          <p:nvPr>
-            <p:ph type="dt" sz="half" idx="10"/>
-          </p:nvPr>
-        </p:nvSpPr>
-        <p:spPr/>
-        <p:txBody>
-          <a:bodyPr/>
-          <a:lstStyle/>
-          <a:p>
-            <a:fld id="{9D01752F-5823-44DB-83D2-46A69D079012}" type="datetime1">
-              <a:rPr lang="es-ES" smtClean="0"/>
-              <a:t>07/03/2015</a:t>
-            </a:fld>
-            <a:endParaRPr lang="es-ES"/>
-          </a:p>
-        </p:txBody>
-      </p:sp>
-      <p:sp>
-        <p:nvSpPr>
           <p:cNvPr id="4" name="3 Marcador de pie de página"/>
           <p:cNvSpPr>
             <a:spLocks noGrp="1"/>
@@ -19885,32 +19173,8 @@
           <a:p>
             <a:r>
               <a:rPr lang="es-AR" smtClean="0"/>
-              <a:t>Introducción a la Plataforma .NET – Presentación</a:t>
-            </a:r>
-            <a:endParaRPr lang="es-ES"/>
-          </a:p>
-        </p:txBody>
-      </p:sp>
-      <p:sp>
-        <p:nvSpPr>
-          <p:cNvPr id="5" name="4 Marcador de número de diapositiva"/>
-          <p:cNvSpPr>
-            <a:spLocks noGrp="1"/>
-          </p:cNvSpPr>
-          <p:nvPr>
-            <p:ph type="sldNum" sz="quarter" idx="12"/>
-          </p:nvPr>
-        </p:nvSpPr>
-        <p:spPr/>
-        <p:txBody>
-          <a:bodyPr/>
-          <a:lstStyle/>
-          <a:p>
-            <a:fld id="{132FADFE-3B8F-471C-ABF0-DBC7717ECBBC}" type="slidenum">
-              <a:rPr lang="es-ES" smtClean="0"/>
-              <a:pPr/>
-              <a:t>24</a:t>
-            </a:fld>
+              <a:t>La Plataforma de desarrollo .NET – Presentación</a:t>
+            </a:r>
             <a:endParaRPr lang="es-ES"/>
           </a:p>
         </p:txBody>
@@ -19978,29 +19242,6 @@
       </p:grpSpPr>
       <p:sp>
         <p:nvSpPr>
-          <p:cNvPr id="3" name="Marcador de fecha 2"/>
-          <p:cNvSpPr>
-            <a:spLocks noGrp="1"/>
-          </p:cNvSpPr>
-          <p:nvPr>
-            <p:ph type="dt" sz="half" idx="10"/>
-          </p:nvPr>
-        </p:nvSpPr>
-        <p:spPr/>
-        <p:txBody>
-          <a:bodyPr/>
-          <a:lstStyle/>
-          <a:p>
-            <a:fld id="{9D01752F-5823-44DB-83D2-46A69D079012}" type="datetime1">
-              <a:rPr lang="es-ES" smtClean="0"/>
-              <a:t>07/03/2015</a:t>
-            </a:fld>
-            <a:endParaRPr lang="es-ES"/>
-          </a:p>
-        </p:txBody>
-      </p:sp>
-      <p:sp>
-        <p:nvSpPr>
           <p:cNvPr id="4" name="Marcador de pie de página 3"/>
           <p:cNvSpPr>
             <a:spLocks noGrp="1"/>
@@ -20016,32 +19257,8 @@
           <a:p>
             <a:r>
               <a:rPr lang="es-AR" smtClean="0"/>
-              <a:t>Introducción a la Plataforma .NET – Presentación</a:t>
-            </a:r>
-            <a:endParaRPr lang="es-ES"/>
-          </a:p>
-        </p:txBody>
-      </p:sp>
-      <p:sp>
-        <p:nvSpPr>
-          <p:cNvPr id="5" name="Marcador de número de diapositiva 4"/>
-          <p:cNvSpPr>
-            <a:spLocks noGrp="1"/>
-          </p:cNvSpPr>
-          <p:nvPr>
-            <p:ph type="sldNum" sz="quarter" idx="12"/>
-          </p:nvPr>
-        </p:nvSpPr>
-        <p:spPr/>
-        <p:txBody>
-          <a:bodyPr/>
-          <a:lstStyle/>
-          <a:p>
-            <a:fld id="{132FADFE-3B8F-471C-ABF0-DBC7717ECBBC}" type="slidenum">
-              <a:rPr lang="es-ES" smtClean="0"/>
-              <a:pPr/>
-              <a:t>25</a:t>
-            </a:fld>
+              <a:t>La Plataforma de desarrollo .NET – Presentación</a:t>
+            </a:r>
             <a:endParaRPr lang="es-ES"/>
           </a:p>
         </p:txBody>
@@ -20178,29 +19395,6 @@
       </p:sp>
       <p:sp>
         <p:nvSpPr>
-          <p:cNvPr id="3" name="Marcador de fecha 2"/>
-          <p:cNvSpPr>
-            <a:spLocks noGrp="1"/>
-          </p:cNvSpPr>
-          <p:nvPr>
-            <p:ph type="dt" sz="half" idx="10"/>
-          </p:nvPr>
-        </p:nvSpPr>
-        <p:spPr/>
-        <p:txBody>
-          <a:bodyPr/>
-          <a:lstStyle/>
-          <a:p>
-            <a:fld id="{9D01752F-5823-44DB-83D2-46A69D079012}" type="datetime1">
-              <a:rPr lang="es-ES" smtClean="0"/>
-              <a:t>07/03/2015</a:t>
-            </a:fld>
-            <a:endParaRPr lang="es-ES"/>
-          </a:p>
-        </p:txBody>
-      </p:sp>
-      <p:sp>
-        <p:nvSpPr>
           <p:cNvPr id="4" name="Marcador de pie de página 3"/>
           <p:cNvSpPr>
             <a:spLocks noGrp="1"/>
@@ -20216,32 +19410,8 @@
           <a:p>
             <a:r>
               <a:rPr lang="es-AR" smtClean="0"/>
-              <a:t>Introducción a la Plataforma .NET – Presentación</a:t>
-            </a:r>
-            <a:endParaRPr lang="es-ES"/>
-          </a:p>
-        </p:txBody>
-      </p:sp>
-      <p:sp>
-        <p:nvSpPr>
-          <p:cNvPr id="5" name="Marcador de número de diapositiva 4"/>
-          <p:cNvSpPr>
-            <a:spLocks noGrp="1"/>
-          </p:cNvSpPr>
-          <p:nvPr>
-            <p:ph type="sldNum" sz="quarter" idx="12"/>
-          </p:nvPr>
-        </p:nvSpPr>
-        <p:spPr/>
-        <p:txBody>
-          <a:bodyPr/>
-          <a:lstStyle/>
-          <a:p>
-            <a:fld id="{132FADFE-3B8F-471C-ABF0-DBC7717ECBBC}" type="slidenum">
-              <a:rPr lang="es-ES" smtClean="0"/>
-              <a:pPr/>
-              <a:t>26</a:t>
-            </a:fld>
+              <a:t>La Plataforma de desarrollo .NET – Presentación</a:t>
+            </a:r>
             <a:endParaRPr lang="es-ES"/>
           </a:p>
         </p:txBody>
@@ -20291,7 +19461,7 @@
           <a:graphicData uri="http://schemas.openxmlformats.org/presentationml/2006/ole">
             <mc:AlternateContent xmlns:mc="http://schemas.openxmlformats.org/markup-compatibility/2006">
               <mc:Choice xmlns:v="urn:schemas-microsoft-com:vml" Requires="v">
-                <p:oleObj spid="_x0000_s4103" name="Ecuación" r:id="rId3" imgW="3644640" imgH="431640" progId="Equation.3">
+                <p:oleObj spid="_x0000_s4104" name="Ecuación" r:id="rId3" imgW="3644640" imgH="431640" progId="Equation.3">
                   <p:embed/>
                 </p:oleObj>
               </mc:Choice>
@@ -20375,11 +19545,7 @@
           <a:p>
             <a:r>
               <a:rPr lang="es-MX" dirty="0" smtClean="0"/>
-              <a:t>Visual Studio </a:t>
-            </a:r>
-            <a:r>
-              <a:rPr lang="es-MX" dirty="0" smtClean="0"/>
-              <a:t>2013 </a:t>
+              <a:t>Visual Studio 2013 </a:t>
             </a:r>
             <a:r>
               <a:rPr lang="es-MX" dirty="0" err="1" smtClean="0"/>
@@ -20565,29 +19731,6 @@
           </a:p>
           <a:p>
             <a:endParaRPr lang="es-AR" dirty="0"/>
-          </a:p>
-        </p:txBody>
-      </p:sp>
-      <p:sp>
-        <p:nvSpPr>
-          <p:cNvPr id="3" name="2 Marcador de fecha"/>
-          <p:cNvSpPr>
-            <a:spLocks noGrp="1"/>
-          </p:cNvSpPr>
-          <p:nvPr>
-            <p:ph type="dt" sz="half" idx="10"/>
-          </p:nvPr>
-        </p:nvSpPr>
-        <p:spPr/>
-        <p:txBody>
-          <a:bodyPr/>
-          <a:lstStyle/>
-          <a:p>
-            <a:fld id="{9D01752F-5823-44DB-83D2-46A69D079012}" type="datetime1">
-              <a:rPr lang="es-ES" smtClean="0"/>
-              <a:t>07/03/2015</a:t>
-            </a:fld>
-            <a:endParaRPr lang="es-ES"/>
           </a:p>
         </p:txBody>
       </p:sp>
@@ -20608,32 +19751,8 @@
           <a:p>
             <a:r>
               <a:rPr lang="es-AR" smtClean="0"/>
-              <a:t>Introducción a la Plataforma .NET – Presentación</a:t>
-            </a:r>
-            <a:endParaRPr lang="es-ES"/>
-          </a:p>
-        </p:txBody>
-      </p:sp>
-      <p:sp>
-        <p:nvSpPr>
-          <p:cNvPr id="5" name="4 Marcador de número de diapositiva"/>
-          <p:cNvSpPr>
-            <a:spLocks noGrp="1"/>
-          </p:cNvSpPr>
-          <p:nvPr>
-            <p:ph type="sldNum" sz="quarter" idx="12"/>
-          </p:nvPr>
-        </p:nvSpPr>
-        <p:spPr/>
-        <p:txBody>
-          <a:bodyPr/>
-          <a:lstStyle/>
-          <a:p>
-            <a:fld id="{132FADFE-3B8F-471C-ABF0-DBC7717ECBBC}" type="slidenum">
-              <a:rPr lang="es-ES" smtClean="0"/>
-              <a:pPr/>
-              <a:t>27</a:t>
-            </a:fld>
+              <a:t>La Plataforma de desarrollo .NET – Presentación</a:t>
+            </a:r>
             <a:endParaRPr lang="es-ES"/>
           </a:p>
         </p:txBody>
@@ -20806,29 +19925,6 @@
       </p:sp>
       <p:sp>
         <p:nvSpPr>
-          <p:cNvPr id="3" name="Marcador de fecha 2"/>
-          <p:cNvSpPr>
-            <a:spLocks noGrp="1"/>
-          </p:cNvSpPr>
-          <p:nvPr>
-            <p:ph type="dt" sz="half" idx="10"/>
-          </p:nvPr>
-        </p:nvSpPr>
-        <p:spPr/>
-        <p:txBody>
-          <a:bodyPr/>
-          <a:lstStyle/>
-          <a:p>
-            <a:fld id="{9D01752F-5823-44DB-83D2-46A69D079012}" type="datetime1">
-              <a:rPr lang="es-ES" smtClean="0"/>
-              <a:t>07/03/2015</a:t>
-            </a:fld>
-            <a:endParaRPr lang="es-ES"/>
-          </a:p>
-        </p:txBody>
-      </p:sp>
-      <p:sp>
-        <p:nvSpPr>
           <p:cNvPr id="4" name="Marcador de pie de página 3"/>
           <p:cNvSpPr>
             <a:spLocks noGrp="1"/>
@@ -20844,32 +19940,8 @@
           <a:p>
             <a:r>
               <a:rPr lang="es-AR" smtClean="0"/>
-              <a:t>Introducción a la Plataforma .NET – Presentación</a:t>
-            </a:r>
-            <a:endParaRPr lang="es-ES"/>
-          </a:p>
-        </p:txBody>
-      </p:sp>
-      <p:sp>
-        <p:nvSpPr>
-          <p:cNvPr id="5" name="Marcador de número de diapositiva 4"/>
-          <p:cNvSpPr>
-            <a:spLocks noGrp="1"/>
-          </p:cNvSpPr>
-          <p:nvPr>
-            <p:ph type="sldNum" sz="quarter" idx="12"/>
-          </p:nvPr>
-        </p:nvSpPr>
-        <p:spPr/>
-        <p:txBody>
-          <a:bodyPr/>
-          <a:lstStyle/>
-          <a:p>
-            <a:fld id="{132FADFE-3B8F-471C-ABF0-DBC7717ECBBC}" type="slidenum">
-              <a:rPr lang="es-ES" smtClean="0"/>
-              <a:pPr/>
-              <a:t>3</a:t>
-            </a:fld>
+              <a:t>La Plataforma de desarrollo .NET – Presentación</a:t>
+            </a:r>
             <a:endParaRPr lang="es-ES"/>
           </a:p>
         </p:txBody>
@@ -21005,29 +20077,6 @@
       </p:sp>
       <p:sp>
         <p:nvSpPr>
-          <p:cNvPr id="3" name="2 Marcador de fecha"/>
-          <p:cNvSpPr>
-            <a:spLocks noGrp="1"/>
-          </p:cNvSpPr>
-          <p:nvPr>
-            <p:ph type="dt" sz="half" idx="10"/>
-          </p:nvPr>
-        </p:nvSpPr>
-        <p:spPr/>
-        <p:txBody>
-          <a:bodyPr/>
-          <a:lstStyle/>
-          <a:p>
-            <a:fld id="{9D01752F-5823-44DB-83D2-46A69D079012}" type="datetime1">
-              <a:rPr lang="es-ES" smtClean="0"/>
-              <a:t>07/03/2015</a:t>
-            </a:fld>
-            <a:endParaRPr lang="es-ES"/>
-          </a:p>
-        </p:txBody>
-      </p:sp>
-      <p:sp>
-        <p:nvSpPr>
           <p:cNvPr id="4" name="3 Marcador de pie de página"/>
           <p:cNvSpPr>
             <a:spLocks noGrp="1"/>
@@ -21043,32 +20092,8 @@
           <a:p>
             <a:r>
               <a:rPr lang="es-AR" smtClean="0"/>
-              <a:t>Introducción a la Plataforma .NET – Presentación</a:t>
-            </a:r>
-            <a:endParaRPr lang="es-ES"/>
-          </a:p>
-        </p:txBody>
-      </p:sp>
-      <p:sp>
-        <p:nvSpPr>
-          <p:cNvPr id="5" name="4 Marcador de número de diapositiva"/>
-          <p:cNvSpPr>
-            <a:spLocks noGrp="1"/>
-          </p:cNvSpPr>
-          <p:nvPr>
-            <p:ph type="sldNum" sz="quarter" idx="12"/>
-          </p:nvPr>
-        </p:nvSpPr>
-        <p:spPr/>
-        <p:txBody>
-          <a:bodyPr/>
-          <a:lstStyle/>
-          <a:p>
-            <a:fld id="{132FADFE-3B8F-471C-ABF0-DBC7717ECBBC}" type="slidenum">
-              <a:rPr lang="es-ES" smtClean="0"/>
-              <a:pPr/>
-              <a:t>4</a:t>
-            </a:fld>
+              <a:t>La Plataforma de desarrollo .NET – Presentación</a:t>
+            </a:r>
             <a:endParaRPr lang="es-ES"/>
           </a:p>
         </p:txBody>
@@ -21288,29 +20313,6 @@
       </p:sp>
       <p:sp>
         <p:nvSpPr>
-          <p:cNvPr id="3" name="Marcador de fecha 2"/>
-          <p:cNvSpPr>
-            <a:spLocks noGrp="1"/>
-          </p:cNvSpPr>
-          <p:nvPr>
-            <p:ph type="dt" sz="half" idx="10"/>
-          </p:nvPr>
-        </p:nvSpPr>
-        <p:spPr/>
-        <p:txBody>
-          <a:bodyPr/>
-          <a:lstStyle/>
-          <a:p>
-            <a:fld id="{9D01752F-5823-44DB-83D2-46A69D079012}" type="datetime1">
-              <a:rPr lang="es-ES" smtClean="0"/>
-              <a:t>07/03/2015</a:t>
-            </a:fld>
-            <a:endParaRPr lang="es-ES"/>
-          </a:p>
-        </p:txBody>
-      </p:sp>
-      <p:sp>
-        <p:nvSpPr>
           <p:cNvPr id="4" name="Marcador de pie de página 3"/>
           <p:cNvSpPr>
             <a:spLocks noGrp="1"/>
@@ -21326,32 +20328,8 @@
           <a:p>
             <a:r>
               <a:rPr lang="es-AR" smtClean="0"/>
-              <a:t>Introducción a la Plataforma .NET – Presentación</a:t>
-            </a:r>
-            <a:endParaRPr lang="es-ES"/>
-          </a:p>
-        </p:txBody>
-      </p:sp>
-      <p:sp>
-        <p:nvSpPr>
-          <p:cNvPr id="5" name="Marcador de número de diapositiva 4"/>
-          <p:cNvSpPr>
-            <a:spLocks noGrp="1"/>
-          </p:cNvSpPr>
-          <p:nvPr>
-            <p:ph type="sldNum" sz="quarter" idx="12"/>
-          </p:nvPr>
-        </p:nvSpPr>
-        <p:spPr/>
-        <p:txBody>
-          <a:bodyPr/>
-          <a:lstStyle/>
-          <a:p>
-            <a:fld id="{132FADFE-3B8F-471C-ABF0-DBC7717ECBBC}" type="slidenum">
-              <a:rPr lang="es-ES" smtClean="0"/>
-              <a:pPr/>
-              <a:t>5</a:t>
-            </a:fld>
+              <a:t>La Plataforma de desarrollo .NET – Presentación</a:t>
+            </a:r>
             <a:endParaRPr lang="es-ES"/>
           </a:p>
         </p:txBody>
@@ -21699,29 +20677,6 @@
       </p:sp>
       <p:sp>
         <p:nvSpPr>
-          <p:cNvPr id="3" name="2 Marcador de fecha"/>
-          <p:cNvSpPr>
-            <a:spLocks noGrp="1"/>
-          </p:cNvSpPr>
-          <p:nvPr>
-            <p:ph type="dt" sz="half" idx="10"/>
-          </p:nvPr>
-        </p:nvSpPr>
-        <p:spPr/>
-        <p:txBody>
-          <a:bodyPr/>
-          <a:lstStyle/>
-          <a:p>
-            <a:fld id="{9D01752F-5823-44DB-83D2-46A69D079012}" type="datetime1">
-              <a:rPr lang="es-ES" smtClean="0"/>
-              <a:t>07/03/2015</a:t>
-            </a:fld>
-            <a:endParaRPr lang="es-ES"/>
-          </a:p>
-        </p:txBody>
-      </p:sp>
-      <p:sp>
-        <p:nvSpPr>
           <p:cNvPr id="4" name="3 Marcador de pie de página"/>
           <p:cNvSpPr>
             <a:spLocks noGrp="1"/>
@@ -21737,32 +20692,8 @@
           <a:p>
             <a:r>
               <a:rPr lang="es-AR" smtClean="0"/>
-              <a:t>Introducción a la Plataforma .NET – Presentación</a:t>
-            </a:r>
-            <a:endParaRPr lang="es-ES"/>
-          </a:p>
-        </p:txBody>
-      </p:sp>
-      <p:sp>
-        <p:nvSpPr>
-          <p:cNvPr id="5" name="4 Marcador de número de diapositiva"/>
-          <p:cNvSpPr>
-            <a:spLocks noGrp="1"/>
-          </p:cNvSpPr>
-          <p:nvPr>
-            <p:ph type="sldNum" sz="quarter" idx="12"/>
-          </p:nvPr>
-        </p:nvSpPr>
-        <p:spPr/>
-        <p:txBody>
-          <a:bodyPr/>
-          <a:lstStyle/>
-          <a:p>
-            <a:fld id="{132FADFE-3B8F-471C-ABF0-DBC7717ECBBC}" type="slidenum">
-              <a:rPr lang="es-ES" smtClean="0"/>
-              <a:pPr/>
-              <a:t>6</a:t>
-            </a:fld>
+              <a:t>La Plataforma de desarrollo .NET – Presentación</a:t>
+            </a:r>
             <a:endParaRPr lang="es-ES"/>
           </a:p>
         </p:txBody>
@@ -21898,29 +20829,6 @@
       </p:sp>
       <p:sp>
         <p:nvSpPr>
-          <p:cNvPr id="3" name="Marcador de fecha 2"/>
-          <p:cNvSpPr>
-            <a:spLocks noGrp="1"/>
-          </p:cNvSpPr>
-          <p:nvPr>
-            <p:ph type="dt" sz="half" idx="10"/>
-          </p:nvPr>
-        </p:nvSpPr>
-        <p:spPr/>
-        <p:txBody>
-          <a:bodyPr/>
-          <a:lstStyle/>
-          <a:p>
-            <a:fld id="{9D01752F-5823-44DB-83D2-46A69D079012}" type="datetime1">
-              <a:rPr lang="es-ES" smtClean="0"/>
-              <a:t>07/03/2015</a:t>
-            </a:fld>
-            <a:endParaRPr lang="es-ES"/>
-          </a:p>
-        </p:txBody>
-      </p:sp>
-      <p:sp>
-        <p:nvSpPr>
           <p:cNvPr id="4" name="Marcador de pie de página 3"/>
           <p:cNvSpPr>
             <a:spLocks noGrp="1"/>
@@ -21936,32 +20844,8 @@
           <a:p>
             <a:r>
               <a:rPr lang="es-AR" smtClean="0"/>
-              <a:t>Introducción a la Plataforma .NET – Presentación</a:t>
-            </a:r>
-            <a:endParaRPr lang="es-ES"/>
-          </a:p>
-        </p:txBody>
-      </p:sp>
-      <p:sp>
-        <p:nvSpPr>
-          <p:cNvPr id="5" name="Marcador de número de diapositiva 4"/>
-          <p:cNvSpPr>
-            <a:spLocks noGrp="1"/>
-          </p:cNvSpPr>
-          <p:nvPr>
-            <p:ph type="sldNum" sz="quarter" idx="12"/>
-          </p:nvPr>
-        </p:nvSpPr>
-        <p:spPr/>
-        <p:txBody>
-          <a:bodyPr/>
-          <a:lstStyle/>
-          <a:p>
-            <a:fld id="{132FADFE-3B8F-471C-ABF0-DBC7717ECBBC}" type="slidenum">
-              <a:rPr lang="es-ES" smtClean="0"/>
-              <a:pPr/>
-              <a:t>7</a:t>
-            </a:fld>
+              <a:t>La Plataforma de desarrollo .NET – Presentación</a:t>
+            </a:r>
             <a:endParaRPr lang="es-ES"/>
           </a:p>
         </p:txBody>
@@ -22288,29 +21172,6 @@
       </p:sp>
       <p:sp>
         <p:nvSpPr>
-          <p:cNvPr id="3" name="Marcador de fecha 2"/>
-          <p:cNvSpPr>
-            <a:spLocks noGrp="1"/>
-          </p:cNvSpPr>
-          <p:nvPr>
-            <p:ph type="dt" sz="half" idx="10"/>
-          </p:nvPr>
-        </p:nvSpPr>
-        <p:spPr/>
-        <p:txBody>
-          <a:bodyPr/>
-          <a:lstStyle/>
-          <a:p>
-            <a:fld id="{9D01752F-5823-44DB-83D2-46A69D079012}" type="datetime1">
-              <a:rPr lang="es-ES" smtClean="0"/>
-              <a:t>07/03/2015</a:t>
-            </a:fld>
-            <a:endParaRPr lang="es-ES"/>
-          </a:p>
-        </p:txBody>
-      </p:sp>
-      <p:sp>
-        <p:nvSpPr>
           <p:cNvPr id="4" name="Marcador de pie de página 3"/>
           <p:cNvSpPr>
             <a:spLocks noGrp="1"/>
@@ -22326,32 +21187,8 @@
           <a:p>
             <a:r>
               <a:rPr lang="es-AR" smtClean="0"/>
-              <a:t>Introducción a la Plataforma .NET – Presentación</a:t>
-            </a:r>
-            <a:endParaRPr lang="es-ES"/>
-          </a:p>
-        </p:txBody>
-      </p:sp>
-      <p:sp>
-        <p:nvSpPr>
-          <p:cNvPr id="5" name="Marcador de número de diapositiva 4"/>
-          <p:cNvSpPr>
-            <a:spLocks noGrp="1"/>
-          </p:cNvSpPr>
-          <p:nvPr>
-            <p:ph type="sldNum" sz="quarter" idx="12"/>
-          </p:nvPr>
-        </p:nvSpPr>
-        <p:spPr/>
-        <p:txBody>
-          <a:bodyPr/>
-          <a:lstStyle/>
-          <a:p>
-            <a:fld id="{132FADFE-3B8F-471C-ABF0-DBC7717ECBBC}" type="slidenum">
-              <a:rPr lang="es-ES" smtClean="0"/>
-              <a:pPr/>
-              <a:t>8</a:t>
-            </a:fld>
+              <a:t>La Plataforma de desarrollo .NET – Presentación</a:t>
+            </a:r>
             <a:endParaRPr lang="es-ES"/>
           </a:p>
         </p:txBody>
@@ -22509,29 +21346,6 @@
       </p:sp>
       <p:sp>
         <p:nvSpPr>
-          <p:cNvPr id="3" name="2 Marcador de fecha"/>
-          <p:cNvSpPr>
-            <a:spLocks noGrp="1"/>
-          </p:cNvSpPr>
-          <p:nvPr>
-            <p:ph type="dt" sz="half" idx="10"/>
-          </p:nvPr>
-        </p:nvSpPr>
-        <p:spPr/>
-        <p:txBody>
-          <a:bodyPr/>
-          <a:lstStyle/>
-          <a:p>
-            <a:fld id="{9D01752F-5823-44DB-83D2-46A69D079012}" type="datetime1">
-              <a:rPr lang="es-ES" smtClean="0"/>
-              <a:t>07/03/2015</a:t>
-            </a:fld>
-            <a:endParaRPr lang="es-ES"/>
-          </a:p>
-        </p:txBody>
-      </p:sp>
-      <p:sp>
-        <p:nvSpPr>
           <p:cNvPr id="4" name="3 Marcador de pie de página"/>
           <p:cNvSpPr>
             <a:spLocks noGrp="1"/>
@@ -22547,32 +21361,8 @@
           <a:p>
             <a:r>
               <a:rPr lang="es-AR" smtClean="0"/>
-              <a:t>Introducción a la Plataforma .NET – Presentación</a:t>
-            </a:r>
-            <a:endParaRPr lang="es-ES"/>
-          </a:p>
-        </p:txBody>
-      </p:sp>
-      <p:sp>
-        <p:nvSpPr>
-          <p:cNvPr id="5" name="4 Marcador de número de diapositiva"/>
-          <p:cNvSpPr>
-            <a:spLocks noGrp="1"/>
-          </p:cNvSpPr>
-          <p:nvPr>
-            <p:ph type="sldNum" sz="quarter" idx="12"/>
-          </p:nvPr>
-        </p:nvSpPr>
-        <p:spPr/>
-        <p:txBody>
-          <a:bodyPr/>
-          <a:lstStyle/>
-          <a:p>
-            <a:fld id="{132FADFE-3B8F-471C-ABF0-DBC7717ECBBC}" type="slidenum">
-              <a:rPr lang="es-ES" smtClean="0"/>
-              <a:pPr/>
-              <a:t>9</a:t>
-            </a:fld>
+              <a:t>La Plataforma de desarrollo .NET – Presentación</a:t>
+            </a:r>
             <a:endParaRPr lang="es-ES"/>
           </a:p>
         </p:txBody>

</xml_diff>